<commit_message>
Clean repository structure for jury presentation
- Remove temporary files: mlruns/, models/, venv/, feature_order.txt
- Update .gitignore to include app/ folder with application code
- Add data/README.md for dataset documentation
- Repository now ready for professional presentation
</commit_message>
<xml_diff>
--- a/Getaround_Project_AH.pptx
+++ b/Getaround_Project_AH.pptx
@@ -1955,7 +1955,94 @@
               <a:buSzPts val="1100"/>
               <a:buNone/>
             </a:pPr>
-            <a:endParaRPr/>
+            <a:r>
+              <a:rPr lang="fr-FR" sz="1100" b="1" noProof="0" dirty="0"/>
+              <a:t>Example de seuil: 60 minutes</a:t>
+            </a:r>
+            <a:br>
+              <a:rPr lang="fr-FR" sz="1100" noProof="0" dirty="0"/>
+            </a:br>
+            <a:r>
+              <a:rPr lang="fr-FR" sz="1100" noProof="0" dirty="0"/>
+              <a:t>Conflits évités: </a:t>
+            </a:r>
+            <a:r>
+              <a:rPr lang="fr-FR" sz="1100" b="1" noProof="0" dirty="0"/>
+              <a:t>176</a:t>
+            </a:r>
+            <a:r>
+              <a:rPr lang="fr-FR" sz="1100" noProof="0" dirty="0"/>
+              <a:t> </a:t>
+            </a:r>
+            <a:r>
+              <a:rPr lang="fr-FR" sz="1100" noProof="0" dirty="0" err="1"/>
+              <a:t>rentals</a:t>
+            </a:r>
+            <a:br>
+              <a:rPr lang="fr-FR" sz="1100" noProof="0" dirty="0"/>
+            </a:br>
+            <a:r>
+              <a:rPr lang="fr-FR" sz="1100" noProof="0" dirty="0"/>
+              <a:t>Etendue pour ‘All cars’: </a:t>
+            </a:r>
+            <a:r>
+              <a:rPr lang="fr-FR" sz="1100" b="1" noProof="0" dirty="0"/>
+              <a:t>176</a:t>
+            </a:r>
+            <a:r>
+              <a:rPr lang="fr-FR" sz="1100" noProof="0" dirty="0"/>
+              <a:t> conflits</a:t>
+            </a:r>
+            <a:br>
+              <a:rPr lang="fr-FR" sz="1100" noProof="0" dirty="0"/>
+            </a:br>
+            <a:r>
+              <a:rPr lang="fr-FR" sz="1100" noProof="0" dirty="0"/>
+              <a:t>Etendue uniquement ‘</a:t>
+            </a:r>
+            <a:r>
+              <a:rPr lang="fr-FR" sz="1100" noProof="0" dirty="0" err="1"/>
+              <a:t>Connect</a:t>
+            </a:r>
+            <a:r>
+              <a:rPr lang="fr-FR" sz="1100" noProof="0" dirty="0"/>
+              <a:t>’: </a:t>
+            </a:r>
+            <a:r>
+              <a:rPr lang="fr-FR" sz="1100" b="1" noProof="0" dirty="0"/>
+              <a:t>63</a:t>
+            </a:r>
+            <a:r>
+              <a:rPr lang="fr-FR" sz="1100" noProof="0" dirty="0"/>
+              <a:t> conflits</a:t>
+            </a:r>
+            <a:br>
+              <a:rPr lang="fr-FR" sz="1100" noProof="0" dirty="0"/>
+            </a:br>
+            <a:br>
+              <a:rPr lang="fr-FR" sz="1100" noProof="0" dirty="0"/>
+            </a:br>
+            <a:r>
+              <a:rPr lang="fr-FR" sz="1100" noProof="0" dirty="0"/>
+              <a:t>Les voitures ‘</a:t>
+            </a:r>
+            <a:r>
+              <a:rPr lang="fr-FR" sz="1100" noProof="0" dirty="0" err="1"/>
+              <a:t>Connect</a:t>
+            </a:r>
+            <a:r>
+              <a:rPr lang="fr-FR" sz="1100" noProof="0" dirty="0"/>
+              <a:t>’ indiquent </a:t>
+            </a:r>
+            <a:r>
+              <a:rPr lang="fr-FR" sz="1100" b="1" noProof="0" dirty="0"/>
+              <a:t>64.2%</a:t>
+            </a:r>
+            <a:r>
+              <a:rPr lang="fr-FR" sz="1100" noProof="0" dirty="0"/>
+              <a:t> moins de conflits</a:t>
+            </a:r>
+            <a:endParaRPr dirty="0"/>
           </a:p>
         </p:txBody>
       </p:sp>
@@ -7193,7 +7280,7 @@
         </p:nvSpPr>
         <p:spPr>
           <a:xfrm>
-            <a:off x="732062" y="2262900"/>
+            <a:off x="635892" y="2684058"/>
             <a:ext cx="6866444" cy="617700"/>
           </a:xfrm>
           <a:prstGeom prst="rect">
@@ -7215,25 +7302,21 @@
             </a:br>
             <a:r>
               <a:rPr lang="fr-FR" sz="2800" b="1" dirty="0"/>
+              <a:t>Concepteur développeur en science des données</a:t>
+            </a:r>
+            <a:br>
+              <a:rPr lang="fr-FR" sz="3200" b="1" dirty="0"/>
+            </a:br>
+            <a:br>
+              <a:rPr lang="fr-FR" sz="3200" b="1" dirty="0"/>
+            </a:br>
+            <a:r>
+              <a:rPr lang="fr-FR" sz="2400" b="1" dirty="0"/>
               <a:t>Machine Learning </a:t>
             </a:r>
             <a:r>
-              <a:rPr lang="fr-FR" sz="2800" b="1" dirty="0" err="1"/>
+              <a:rPr lang="fr-FR" sz="2400" b="1" dirty="0" err="1"/>
               <a:t>Engineer</a:t>
-            </a:r>
-            <a:r>
-              <a:rPr lang="fr-FR" sz="2800" b="1" dirty="0"/>
-              <a:t> </a:t>
-            </a:r>
-            <a:br>
-              <a:rPr lang="fr-FR" sz="2800" dirty="0"/>
-            </a:br>
-            <a:br>
-              <a:rPr lang="fr-FR" sz="2800" dirty="0"/>
-            </a:br>
-            <a:r>
-              <a:rPr lang="fr-FR" sz="2800" dirty="0"/>
-              <a:t>Certification at JEDHA</a:t>
             </a:r>
             <a:endParaRPr sz="2800" dirty="0">
               <a:solidFill>
@@ -7315,7 +7398,7 @@
         </p:nvSpPr>
         <p:spPr>
           <a:xfrm>
-            <a:off x="840549" y="3087788"/>
+            <a:off x="708813" y="3294977"/>
             <a:ext cx="4882075" cy="533100"/>
           </a:xfrm>
           <a:prstGeom prst="rect">
@@ -7330,7 +7413,11 @@
           <a:p>
             <a:pPr algn="l"/>
             <a:r>
-              <a:rPr lang="fr-FR" sz="2400" dirty="0"/>
+              <a:rPr lang="fr-FR" sz="2400" b="1" dirty="0">
+                <a:solidFill>
+                  <a:srgbClr val="FFFF00"/>
+                </a:solidFill>
+              </a:rPr>
               <a:t>Bloc 5</a:t>
             </a:r>
           </a:p>
@@ -7352,7 +7439,7 @@
         </p:nvSpPr>
         <p:spPr>
           <a:xfrm>
-            <a:off x="840550" y="3828077"/>
+            <a:off x="796137" y="3925850"/>
             <a:ext cx="5315100" cy="533100"/>
           </a:xfrm>
           <a:prstGeom prst="rect">
@@ -7743,8 +7830,8 @@
         </p:nvSpPr>
         <p:spPr>
           <a:xfrm>
-            <a:off x="438808" y="967077"/>
-            <a:ext cx="2988031" cy="3774288"/>
+            <a:off x="271795" y="1369383"/>
+            <a:ext cx="2988031" cy="2210076"/>
           </a:xfrm>
           <a:prstGeom prst="rect">
             <a:avLst/>
@@ -7761,36 +7848,40 @@
           <a:lstStyle/>
           <a:p>
             <a:r>
-              <a:rPr lang="en-US" b="1" dirty="0">
+              <a:rPr lang="fr-FR" b="1" noProof="0" dirty="0">
                 <a:solidFill>
                   <a:schemeClr val="tx1"/>
                 </a:solidFill>
               </a:rPr>
-              <a:t>Experiment Tracking</a:t>
-            </a:r>
-            <a:br>
-              <a:rPr lang="en-US" dirty="0"/>
-            </a:br>
-            <a:br>
-              <a:rPr lang="en-US" dirty="0"/>
-            </a:br>
-            <a:r>
-              <a:rPr lang="en-US" dirty="0"/>
-              <a:t>- </a:t>
-            </a:r>
-            <a:r>
-              <a:rPr lang="en-US" dirty="0" err="1"/>
+              <a:t>Suivi du modèle</a:t>
+            </a:r>
+            <a:br>
+              <a:rPr lang="fr-FR" noProof="0" dirty="0"/>
+            </a:br>
+            <a:br>
+              <a:rPr lang="fr-FR" noProof="0" dirty="0"/>
+            </a:br>
+            <a:r>
+              <a:rPr lang="fr-FR" noProof="0" dirty="0"/>
+              <a:t>- Dashboard</a:t>
+            </a:r>
+            <a:r>
+              <a:rPr lang="fr-FR" dirty="0"/>
+              <a:t> visuelle</a:t>
+            </a:r>
+            <a:r>
+              <a:rPr lang="fr-FR" noProof="0" dirty="0"/>
+              <a:t> </a:t>
+            </a:r>
+            <a:r>
+              <a:rPr lang="fr-FR" noProof="0" dirty="0" err="1"/>
               <a:t>MLFlow</a:t>
             </a:r>
-            <a:r>
-              <a:rPr lang="en-US" dirty="0"/>
-              <a:t> Dashboard deployed on HF</a:t>
-            </a:r>
-            <a:br>
-              <a:rPr lang="fr-FR" b="1" dirty="0"/>
-            </a:br>
-            <a:br>
-              <a:rPr lang="fr" sz="2400" dirty="0">
+            <a:br>
+              <a:rPr lang="fr-FR" b="1" noProof="0" dirty="0"/>
+            </a:br>
+            <a:br>
+              <a:rPr lang="fr-FR" sz="2400" noProof="0" dirty="0">
                 <a:solidFill>
                   <a:srgbClr val="015955"/>
                 </a:solidFill>
@@ -7801,7 +7892,7 @@
               </a:rPr>
             </a:br>
             <a:br>
-              <a:rPr lang="fr" sz="2400" dirty="0">
+              <a:rPr lang="fr-FR" sz="2400" noProof="0" dirty="0">
                 <a:solidFill>
                   <a:srgbClr val="015955"/>
                 </a:solidFill>
@@ -7811,7 +7902,7 @@
                 <a:sym typeface="Inter"/>
               </a:rPr>
             </a:br>
-            <a:endParaRPr sz="2400" dirty="0">
+            <a:endParaRPr lang="fr-FR" sz="2400" noProof="0" dirty="0">
               <a:solidFill>
                 <a:srgbClr val="015955"/>
               </a:solidFill>
@@ -7893,138 +7984,39 @@
           <a:p>
             <a:r>
               <a:rPr lang="fr-FR" sz="2000" b="1" dirty="0"/>
-              <a:t>Key </a:t>
-            </a:r>
-            <a:r>
-              <a:rPr lang="fr-FR" sz="2000" b="1" dirty="0" err="1"/>
-              <a:t>Features</a:t>
-            </a:r>
-            <a:r>
-              <a:rPr lang="fr-FR" sz="2000" b="1" dirty="0"/>
-              <a:t>:</a:t>
-            </a:r>
-            <a:br>
-              <a:rPr lang="fr-FR" sz="2000" b="1" dirty="0"/>
-            </a:br>
+              <a:t>Eléments clés:</a:t>
+            </a:r>
             <a:br>
               <a:rPr lang="fr-FR" sz="1800" dirty="0"/>
             </a:br>
             <a:r>
               <a:rPr lang="fr-FR" sz="1800" dirty="0"/>
-              <a:t>- Complete </a:t>
-            </a:r>
-            <a:r>
-              <a:rPr lang="fr-FR" sz="1800" dirty="0" err="1"/>
-              <a:t>experiment</a:t>
-            </a:r>
-            <a:r>
+              <a:t>- Versionnage complet du modèle</a:t>
+            </a:r>
+            <a:br>
               <a:rPr lang="fr-FR" sz="1800" dirty="0"/>
-              <a:t> versioning</a:t>
-            </a:r>
-            <a:br>
+            </a:br>
+            <a:r>
               <a:rPr lang="fr-FR" sz="1800" dirty="0"/>
-            </a:br>
-            <a:r>
+              <a:t>- Comparaison de la performance du modèle pour les 4 algorithmes</a:t>
+            </a:r>
+            <a:br>
               <a:rPr lang="fr-FR" sz="1800" dirty="0"/>
-              <a:t>- Model performance </a:t>
-            </a:r>
-            <a:r>
-              <a:rPr lang="fr-FR" sz="1800" dirty="0" err="1"/>
-              <a:t>comparison</a:t>
-            </a:r>
+            </a:br>
             <a:r>
               <a:rPr lang="fr-FR" sz="1800" dirty="0"/>
-              <a:t> </a:t>
-            </a:r>
-            <a:r>
-              <a:rPr lang="fr-FR" sz="1800" dirty="0" err="1"/>
-              <a:t>across</a:t>
-            </a:r>
-            <a:r>
+              <a:t>- Suivi des hyperparamètres et de l’historique d’optimisation</a:t>
+            </a:r>
+            <a:br>
               <a:rPr lang="fr-FR" sz="1800" dirty="0"/>
-              <a:t> 4 </a:t>
-            </a:r>
-            <a:r>
-              <a:rPr lang="fr-FR" sz="1800" dirty="0" err="1"/>
-              <a:t>algorithms</a:t>
-            </a:r>
-            <a:br>
+            </a:br>
+            <a:r>
               <a:rPr lang="fr-FR" sz="1800" dirty="0"/>
-            </a:br>
-            <a:r>
+              <a:t>- Flux de développement du modèle</a:t>
+            </a:r>
+            <a:br>
               <a:rPr lang="fr-FR" sz="1800" dirty="0"/>
-              <a:t>- </a:t>
-            </a:r>
-            <a:r>
-              <a:rPr lang="fr-FR" sz="1800" dirty="0" err="1"/>
-              <a:t>Hyperparameter</a:t>
-            </a:r>
-            <a:r>
-              <a:rPr lang="fr-FR" sz="1800" dirty="0"/>
-              <a:t> </a:t>
-            </a:r>
-            <a:r>
-              <a:rPr lang="fr-FR" sz="1800" dirty="0" err="1"/>
-              <a:t>tracking</a:t>
-            </a:r>
-            <a:r>
-              <a:rPr lang="fr-FR" sz="1800" dirty="0"/>
-              <a:t> and </a:t>
-            </a:r>
-            <a:r>
-              <a:rPr lang="fr-FR" sz="1800" dirty="0" err="1"/>
-              <a:t>optimization</a:t>
-            </a:r>
-            <a:r>
-              <a:rPr lang="fr-FR" sz="1800" dirty="0"/>
-              <a:t> </a:t>
-            </a:r>
-            <a:r>
-              <a:rPr lang="fr-FR" sz="1800" dirty="0" err="1"/>
-              <a:t>history</a:t>
-            </a:r>
-            <a:br>
-              <a:rPr lang="fr-FR" sz="1800" dirty="0"/>
-            </a:br>
-            <a:r>
-              <a:rPr lang="fr-FR" sz="1800" dirty="0"/>
-              <a:t>- ML </a:t>
-            </a:r>
-            <a:r>
-              <a:rPr lang="fr-FR" sz="1800" dirty="0" err="1"/>
-              <a:t>development</a:t>
-            </a:r>
-            <a:r>
-              <a:rPr lang="fr-FR" sz="1800" dirty="0"/>
-              <a:t> workflow</a:t>
-            </a:r>
-            <a:br>
-              <a:rPr lang="fr-FR" sz="1800" dirty="0"/>
-            </a:br>
-            <a:r>
-              <a:rPr lang="fr-FR" sz="1800" dirty="0"/>
-              <a:t>- Visual </a:t>
-            </a:r>
-            <a:r>
-              <a:rPr lang="fr-FR" sz="1800" dirty="0" err="1"/>
-              <a:t>experiment</a:t>
-            </a:r>
-            <a:r>
-              <a:rPr lang="fr-FR" sz="1800" dirty="0"/>
-              <a:t> </a:t>
-            </a:r>
-            <a:r>
-              <a:rPr lang="fr-FR" sz="1800" dirty="0" err="1"/>
-              <a:t>analysis</a:t>
-            </a:r>
-            <a:r>
-              <a:rPr lang="fr-FR" sz="1800" dirty="0"/>
-              <a:t> </a:t>
-            </a:r>
-            <a:r>
-              <a:rPr lang="fr-FR" sz="1800" dirty="0" err="1"/>
-              <a:t>dashboard</a:t>
-            </a:r>
+            </a:br>
             <a:br>
               <a:rPr lang="fr-FR" dirty="0"/>
             </a:br>
@@ -8069,8 +8061,8 @@
         </p:blipFill>
         <p:spPr>
           <a:xfrm>
-            <a:off x="4227006" y="2945066"/>
-            <a:ext cx="3742016" cy="2198434"/>
+            <a:off x="4207790" y="2814246"/>
+            <a:ext cx="3621747" cy="2127776"/>
           </a:xfrm>
           <a:prstGeom prst="rect">
             <a:avLst/>
@@ -8194,7 +8186,7 @@
         <p:spPr>
           <a:xfrm>
             <a:off x="406097" y="1030187"/>
-            <a:ext cx="2988031" cy="3458100"/>
+            <a:ext cx="2988031" cy="4045508"/>
           </a:xfrm>
           <a:prstGeom prst="rect">
             <a:avLst/>
@@ -8213,19 +8205,19 @@
             <a:r>
               <a:rPr lang="fr" sz="2400" b="1" dirty="0">
                 <a:solidFill>
-                  <a:srgbClr val="015955"/>
+                  <a:schemeClr val="tx1"/>
                 </a:solidFill>
                 <a:latin typeface="Inter"/>
                 <a:ea typeface="Inter"/>
                 <a:cs typeface="Inter"/>
                 <a:sym typeface="Inter"/>
               </a:rPr>
-              <a:t>Major technologies used for 3 Applications </a:t>
+              <a:t>Technologies majeurs utilisées pour les 3 applications </a:t>
             </a:r>
             <a:br>
               <a:rPr lang="fr" sz="2400" b="1" dirty="0">
                 <a:solidFill>
-                  <a:srgbClr val="015955"/>
+                  <a:schemeClr val="tx1"/>
                 </a:solidFill>
                 <a:latin typeface="Inter"/>
                 <a:ea typeface="Inter"/>
@@ -8236,14 +8228,14 @@
             <a:r>
               <a:rPr lang="fr" sz="2400" b="1" dirty="0">
                 <a:solidFill>
-                  <a:srgbClr val="015955"/>
+                  <a:schemeClr val="tx1"/>
                 </a:solidFill>
                 <a:latin typeface="Inter"/>
                 <a:ea typeface="Inter"/>
                 <a:cs typeface="Inter"/>
                 <a:sym typeface="Inter"/>
               </a:rPr>
-              <a:t>Deployed:</a:t>
+              <a:t>déployées</a:t>
             </a:r>
             <a:br>
               <a:rPr lang="fr" sz="2400" dirty="0">
@@ -8270,53 +8262,6 @@
             <a:br>
               <a:rPr lang="fr-FR" sz="1200" b="1" dirty="0"/>
             </a:br>
-            <a:r>
-              <a:rPr lang="fr-FR" sz="1600" b="1" dirty="0" err="1"/>
-              <a:t>FastAPI</a:t>
-            </a:r>
-            <a:br>
-              <a:rPr lang="fr-FR" sz="1600" dirty="0"/>
-            </a:br>
-            <a:r>
-              <a:rPr lang="fr-FR" sz="1600" b="1" dirty="0" err="1"/>
-              <a:t>Streamlit</a:t>
-            </a:r>
-            <a:br>
-              <a:rPr lang="fr-FR" sz="1600" dirty="0"/>
-            </a:br>
-            <a:r>
-              <a:rPr lang="fr-FR" sz="1600" b="1" dirty="0"/>
-              <a:t>Docker</a:t>
-            </a:r>
-            <a:br>
-              <a:rPr lang="fr-FR" sz="1600" b="1" dirty="0"/>
-            </a:br>
-            <a:r>
-              <a:rPr lang="fr-FR" sz="1600" b="1" dirty="0" err="1"/>
-              <a:t>MLFlow</a:t>
-            </a:r>
-            <a:br>
-              <a:rPr lang="fr-FR" sz="1600" dirty="0"/>
-            </a:br>
-            <a:r>
-              <a:rPr lang="fr-FR" sz="1600" b="1" dirty="0" err="1"/>
-              <a:t>Hugging</a:t>
-            </a:r>
-            <a:r>
-              <a:rPr lang="fr-FR" sz="1600" b="1" dirty="0"/>
-              <a:t> Face </a:t>
-            </a:r>
-            <a:r>
-              <a:rPr lang="fr-FR" sz="1600" b="1" dirty="0" err="1"/>
-              <a:t>Spaces</a:t>
-            </a:r>
-            <a:br>
-              <a:rPr lang="fr-FR" sz="1600" dirty="0"/>
-            </a:br>
-            <a:r>
-              <a:rPr lang="fr-FR" sz="1600" b="1" dirty="0"/>
-              <a:t>GitHub</a:t>
-            </a:r>
             <a:br>
               <a:rPr lang="fr-FR" sz="1600" dirty="0"/>
             </a:br>
@@ -8398,8 +8343,8 @@
         </p:nvSpPr>
         <p:spPr>
           <a:xfrm>
-            <a:off x="3794726" y="1131376"/>
-            <a:ext cx="5315100" cy="3944319"/>
+            <a:off x="3693986" y="737048"/>
+            <a:ext cx="5315100" cy="2712204"/>
           </a:xfrm>
           <a:prstGeom prst="rect">
             <a:avLst/>
@@ -8416,67 +8361,373 @@
           <a:lstStyle/>
           <a:p>
             <a:r>
-              <a:rPr lang="en-US" sz="1800" b="1" dirty="0"/>
-              <a:t>Development vs Deployment</a:t>
-            </a:r>
-            <a:br>
-              <a:rPr lang="en-US" sz="1800" b="1" dirty="0"/>
-            </a:br>
-            <a:br>
-              <a:rPr lang="en-US" sz="1800" b="1" dirty="0"/>
-            </a:br>
-            <a:r>
-              <a:rPr lang="en-US" sz="1800" b="1" dirty="0"/>
-              <a:t>- Separated repositories: </a:t>
-            </a:r>
-            <a:r>
-              <a:rPr lang="en-US" sz="1800" dirty="0"/>
-              <a:t>Clean ML development portfolio with notebooks, trained models, and core utilities hosted on </a:t>
-            </a:r>
-            <a:r>
-              <a:rPr lang="en-US" sz="1800" b="1" dirty="0"/>
+              <a:rPr lang="fr-FR" sz="1800" b="1" noProof="0" dirty="0"/>
+              <a:t>Développement vs Déploiement</a:t>
+            </a:r>
+            <a:br>
+              <a:rPr lang="fr-FR" sz="1800" b="1" noProof="0" dirty="0"/>
+            </a:br>
+            <a:br>
+              <a:rPr lang="fr-FR" sz="1800" b="1" noProof="0" dirty="0"/>
+            </a:br>
+            <a:r>
+              <a:rPr lang="fr-FR" sz="1800" b="1" noProof="0" dirty="0"/>
+              <a:t>- Dépôts séparés: </a:t>
+            </a:r>
+            <a:r>
+              <a:rPr lang="fr-FR" sz="1800" noProof="0" dirty="0"/>
+              <a:t>un dépôt de développement d’un modèle d’</a:t>
+            </a:r>
+            <a:r>
+              <a:rPr lang="fr-FR" sz="1800" noProof="0" dirty="0" err="1"/>
+              <a:t>appre</a:t>
+            </a:r>
+            <a:r>
+              <a:rPr lang="fr-FR" sz="1800" dirty="0" err="1"/>
+              <a:t>ntissage</a:t>
+            </a:r>
+            <a:r>
+              <a:rPr lang="fr-FR" sz="1800" dirty="0"/>
+              <a:t> automatique</a:t>
+            </a:r>
+            <a:r>
+              <a:rPr lang="fr-FR" sz="1800" noProof="0" dirty="0"/>
+              <a:t> (ML) hébergé sur </a:t>
+            </a:r>
+            <a:r>
+              <a:rPr lang="fr-FR" sz="1800" b="1" noProof="0" dirty="0"/>
               <a:t>GitHub</a:t>
             </a:r>
             <a:br>
-              <a:rPr lang="en-US" sz="1800" dirty="0"/>
-            </a:br>
-            <a:br>
-              <a:rPr lang="en-US" sz="1800" dirty="0"/>
-            </a:br>
-            <a:r>
-              <a:rPr lang="en-US" sz="1800" dirty="0"/>
+              <a:rPr lang="fr-FR" sz="1800" noProof="0" dirty="0"/>
+            </a:br>
+            <a:br>
+              <a:rPr lang="fr-FR" sz="1800" noProof="0" dirty="0"/>
+            </a:br>
+            <a:r>
+              <a:rPr lang="fr-FR" sz="1800" noProof="0" dirty="0"/>
               <a:t>- </a:t>
             </a:r>
             <a:r>
-              <a:rPr lang="en-US" sz="1800" b="1" dirty="0"/>
-              <a:t>HF Spaces </a:t>
-            </a:r>
-            <a:r>
-              <a:rPr lang="en-US" sz="1800" dirty="0"/>
-              <a:t>used for production-optimized deployments with containerized applications and live APIs</a:t>
-            </a:r>
-            <a:br>
-              <a:rPr lang="en-US" sz="1800" dirty="0"/>
-            </a:br>
-            <a:br>
-              <a:rPr lang="en-US" dirty="0"/>
-            </a:br>
-            <a:br>
-              <a:rPr lang="fr-FR" dirty="0"/>
-            </a:br>
-            <a:br>
-              <a:rPr lang="fr-FR" sz="1800" dirty="0"/>
-            </a:br>
-            <a:br>
-              <a:rPr lang="fr-FR" sz="1600" dirty="0"/>
-            </a:br>
-            <a:br>
-              <a:rPr lang="fr-FR" dirty="0"/>
-            </a:br>
-            <a:endParaRPr lang="en-US" sz="1600" dirty="0"/>
+              <a:rPr lang="fr-FR" sz="1800" b="1" noProof="0" dirty="0"/>
+              <a:t>HF </a:t>
+            </a:r>
+            <a:r>
+              <a:rPr lang="fr-FR" sz="1800" b="1" noProof="0" dirty="0" err="1"/>
+              <a:t>Spaces</a:t>
+            </a:r>
+            <a:r>
+              <a:rPr lang="fr-FR" sz="1800" b="1" noProof="0" dirty="0"/>
+              <a:t> </a:t>
+            </a:r>
+            <a:r>
+              <a:rPr lang="fr-FR" sz="1800" noProof="0" dirty="0"/>
+              <a:t>utilisé pour le déploiement des applications conteneurisées et de l’API</a:t>
+            </a:r>
+            <a:br>
+              <a:rPr lang="fr-FR" sz="1800" noProof="0" dirty="0"/>
+            </a:br>
+            <a:br>
+              <a:rPr lang="fr-FR" noProof="0" dirty="0"/>
+            </a:br>
+            <a:br>
+              <a:rPr lang="fr-FR" noProof="0" dirty="0"/>
+            </a:br>
+            <a:br>
+              <a:rPr lang="fr-FR" sz="1800" noProof="0" dirty="0"/>
+            </a:br>
+            <a:br>
+              <a:rPr lang="fr-FR" sz="1600" noProof="0" dirty="0"/>
+            </a:br>
+            <a:br>
+              <a:rPr lang="fr-FR" noProof="0" dirty="0"/>
+            </a:br>
+            <a:endParaRPr lang="fr-FR" sz="1600" noProof="0" dirty="0"/>
           </a:p>
         </p:txBody>
       </p:sp>
+      <p:pic>
+        <p:nvPicPr>
+          <p:cNvPr id="1028" name="Picture 4">
+            <a:extLst>
+              <a:ext uri="{FF2B5EF4-FFF2-40B4-BE49-F238E27FC236}">
+                <a16:creationId xmlns:a16="http://schemas.microsoft.com/office/drawing/2014/main" id="{9438449A-3838-CE11-632B-C1D69721E479}"/>
+              </a:ext>
+            </a:extLst>
+          </p:cNvPr>
+          <p:cNvPicPr>
+            <a:picLocks noChangeAspect="1" noChangeArrowheads="1"/>
+          </p:cNvPicPr>
+          <p:nvPr/>
+        </p:nvPicPr>
+        <p:blipFill>
+          <a:blip r:embed="rId4">
+            <a:extLst>
+              <a:ext uri="{28A0092B-C50C-407E-A947-70E740481C1C}">
+                <a14:useLocalDpi xmlns:a14="http://schemas.microsoft.com/office/drawing/2010/main" val="0"/>
+              </a:ext>
+            </a:extLst>
+          </a:blip>
+          <a:srcRect/>
+          <a:stretch>
+            <a:fillRect/>
+          </a:stretch>
+        </p:blipFill>
+        <p:spPr bwMode="auto">
+          <a:xfrm>
+            <a:off x="3852862" y="4012123"/>
+            <a:ext cx="1179469" cy="928445"/>
+          </a:xfrm>
+          <a:prstGeom prst="rect">
+            <a:avLst/>
+          </a:prstGeom>
+          <a:noFill/>
+          <a:extLst>
+            <a:ext uri="{909E8E84-426E-40DD-AFC4-6F175D3DCCD1}">
+              <a14:hiddenFill xmlns:a14="http://schemas.microsoft.com/office/drawing/2010/main">
+                <a:solidFill>
+                  <a:srgbClr val="FFFFFF"/>
+                </a:solidFill>
+              </a14:hiddenFill>
+            </a:ext>
+          </a:extLst>
+        </p:spPr>
+      </p:pic>
+      <p:pic>
+        <p:nvPicPr>
+          <p:cNvPr id="1030" name="Picture 6">
+            <a:extLst>
+              <a:ext uri="{FF2B5EF4-FFF2-40B4-BE49-F238E27FC236}">
+                <a16:creationId xmlns:a16="http://schemas.microsoft.com/office/drawing/2014/main" id="{F400A4D5-C4B8-30C6-F967-D6098080BC27}"/>
+              </a:ext>
+            </a:extLst>
+          </p:cNvPr>
+          <p:cNvPicPr>
+            <a:picLocks noChangeAspect="1" noChangeArrowheads="1"/>
+          </p:cNvPicPr>
+          <p:nvPr/>
+        </p:nvPicPr>
+        <p:blipFill>
+          <a:blip r:embed="rId5">
+            <a:extLst>
+              <a:ext uri="{28A0092B-C50C-407E-A947-70E740481C1C}">
+                <a14:useLocalDpi xmlns:a14="http://schemas.microsoft.com/office/drawing/2010/main" val="0"/>
+              </a:ext>
+            </a:extLst>
+          </a:blip>
+          <a:srcRect/>
+          <a:stretch>
+            <a:fillRect/>
+          </a:stretch>
+        </p:blipFill>
+        <p:spPr bwMode="auto">
+          <a:xfrm>
+            <a:off x="5626859" y="3783201"/>
+            <a:ext cx="1190625" cy="1285875"/>
+          </a:xfrm>
+          <a:prstGeom prst="rect">
+            <a:avLst/>
+          </a:prstGeom>
+          <a:noFill/>
+          <a:extLst>
+            <a:ext uri="{909E8E84-426E-40DD-AFC4-6F175D3DCCD1}">
+              <a14:hiddenFill xmlns:a14="http://schemas.microsoft.com/office/drawing/2010/main">
+                <a:solidFill>
+                  <a:srgbClr val="FFFFFF"/>
+                </a:solidFill>
+              </a14:hiddenFill>
+            </a:ext>
+          </a:extLst>
+        </p:spPr>
+      </p:pic>
+      <p:pic>
+        <p:nvPicPr>
+          <p:cNvPr id="1032" name="Picture 8">
+            <a:extLst>
+              <a:ext uri="{FF2B5EF4-FFF2-40B4-BE49-F238E27FC236}">
+                <a16:creationId xmlns:a16="http://schemas.microsoft.com/office/drawing/2014/main" id="{4A7E0D28-6A99-9B3E-3F0E-D5FED6B83C46}"/>
+              </a:ext>
+            </a:extLst>
+          </p:cNvPr>
+          <p:cNvPicPr>
+            <a:picLocks noChangeAspect="1" noChangeArrowheads="1"/>
+          </p:cNvPicPr>
+          <p:nvPr/>
+        </p:nvPicPr>
+        <p:blipFill>
+          <a:blip r:embed="rId6">
+            <a:extLst>
+              <a:ext uri="{28A0092B-C50C-407E-A947-70E740481C1C}">
+                <a14:useLocalDpi xmlns:a14="http://schemas.microsoft.com/office/drawing/2010/main" val="0"/>
+              </a:ext>
+            </a:extLst>
+          </a:blip>
+          <a:srcRect/>
+          <a:stretch>
+            <a:fillRect/>
+          </a:stretch>
+        </p:blipFill>
+        <p:spPr bwMode="auto">
+          <a:xfrm>
+            <a:off x="7512356" y="4012123"/>
+            <a:ext cx="1309728" cy="873152"/>
+          </a:xfrm>
+          <a:prstGeom prst="rect">
+            <a:avLst/>
+          </a:prstGeom>
+          <a:noFill/>
+          <a:extLst>
+            <a:ext uri="{909E8E84-426E-40DD-AFC4-6F175D3DCCD1}">
+              <a14:hiddenFill xmlns:a14="http://schemas.microsoft.com/office/drawing/2010/main">
+                <a:solidFill>
+                  <a:srgbClr val="FFFFFF"/>
+                </a:solidFill>
+              </a14:hiddenFill>
+            </a:ext>
+          </a:extLst>
+        </p:spPr>
+      </p:pic>
+      <p:pic>
+        <p:nvPicPr>
+          <p:cNvPr id="1034" name="Picture 10">
+            <a:extLst>
+              <a:ext uri="{FF2B5EF4-FFF2-40B4-BE49-F238E27FC236}">
+                <a16:creationId xmlns:a16="http://schemas.microsoft.com/office/drawing/2014/main" id="{DDBC7947-D5BC-E785-A901-A0B964F3AE94}"/>
+              </a:ext>
+            </a:extLst>
+          </p:cNvPr>
+          <p:cNvPicPr>
+            <a:picLocks noChangeAspect="1" noChangeArrowheads="1"/>
+          </p:cNvPicPr>
+          <p:nvPr/>
+        </p:nvPicPr>
+        <p:blipFill>
+          <a:blip r:embed="rId7">
+            <a:extLst>
+              <a:ext uri="{28A0092B-C50C-407E-A947-70E740481C1C}">
+                <a14:useLocalDpi xmlns:a14="http://schemas.microsoft.com/office/drawing/2010/main" val="0"/>
+              </a:ext>
+            </a:extLst>
+          </a:blip>
+          <a:srcRect/>
+          <a:stretch>
+            <a:fillRect/>
+          </a:stretch>
+        </p:blipFill>
+        <p:spPr bwMode="auto">
+          <a:xfrm>
+            <a:off x="226613" y="3449252"/>
+            <a:ext cx="1170222" cy="681136"/>
+          </a:xfrm>
+          <a:prstGeom prst="rect">
+            <a:avLst/>
+          </a:prstGeom>
+          <a:noFill/>
+          <a:extLst>
+            <a:ext uri="{909E8E84-426E-40DD-AFC4-6F175D3DCCD1}">
+              <a14:hiddenFill xmlns:a14="http://schemas.microsoft.com/office/drawing/2010/main">
+                <a:solidFill>
+                  <a:srgbClr val="FFFFFF"/>
+                </a:solidFill>
+              </a14:hiddenFill>
+            </a:ext>
+          </a:extLst>
+        </p:spPr>
+      </p:pic>
+      <p:pic>
+        <p:nvPicPr>
+          <p:cNvPr id="1036" name="Picture 12">
+            <a:extLst>
+              <a:ext uri="{FF2B5EF4-FFF2-40B4-BE49-F238E27FC236}">
+                <a16:creationId xmlns:a16="http://schemas.microsoft.com/office/drawing/2014/main" id="{37DE8088-33F7-7F34-57D7-43897555D0A9}"/>
+              </a:ext>
+            </a:extLst>
+          </p:cNvPr>
+          <p:cNvPicPr>
+            <a:picLocks noChangeAspect="1" noChangeArrowheads="1"/>
+          </p:cNvPicPr>
+          <p:nvPr/>
+        </p:nvPicPr>
+        <p:blipFill>
+          <a:blip r:embed="rId8">
+            <a:extLst>
+              <a:ext uri="{28A0092B-C50C-407E-A947-70E740481C1C}">
+                <a14:useLocalDpi xmlns:a14="http://schemas.microsoft.com/office/drawing/2010/main" val="0"/>
+              </a:ext>
+            </a:extLst>
+          </a:blip>
+          <a:srcRect/>
+          <a:stretch>
+            <a:fillRect/>
+          </a:stretch>
+        </p:blipFill>
+        <p:spPr bwMode="auto">
+          <a:xfrm>
+            <a:off x="7299701" y="3271087"/>
+            <a:ext cx="1340602" cy="356330"/>
+          </a:xfrm>
+          <a:prstGeom prst="rect">
+            <a:avLst/>
+          </a:prstGeom>
+          <a:noFill/>
+          <a:extLst>
+            <a:ext uri="{909E8E84-426E-40DD-AFC4-6F175D3DCCD1}">
+              <a14:hiddenFill xmlns:a14="http://schemas.microsoft.com/office/drawing/2010/main">
+                <a:solidFill>
+                  <a:srgbClr val="FFFFFF"/>
+                </a:solidFill>
+              </a14:hiddenFill>
+            </a:ext>
+          </a:extLst>
+        </p:spPr>
+      </p:pic>
+      <p:pic>
+        <p:nvPicPr>
+          <p:cNvPr id="1038" name="Picture 14">
+            <a:extLst>
+              <a:ext uri="{FF2B5EF4-FFF2-40B4-BE49-F238E27FC236}">
+                <a16:creationId xmlns:a16="http://schemas.microsoft.com/office/drawing/2014/main" id="{A1196ECF-9E65-D72A-A267-7642DFD23146}"/>
+              </a:ext>
+            </a:extLst>
+          </p:cNvPr>
+          <p:cNvPicPr>
+            <a:picLocks noChangeAspect="1" noChangeArrowheads="1"/>
+          </p:cNvPicPr>
+          <p:nvPr/>
+        </p:nvPicPr>
+        <p:blipFill>
+          <a:blip r:embed="rId9">
+            <a:extLst>
+              <a:ext uri="{28A0092B-C50C-407E-A947-70E740481C1C}">
+                <a14:useLocalDpi xmlns:a14="http://schemas.microsoft.com/office/drawing/2010/main" val="0"/>
+              </a:ext>
+            </a:extLst>
+          </a:blip>
+          <a:srcRect/>
+          <a:stretch>
+            <a:fillRect/>
+          </a:stretch>
+        </p:blipFill>
+        <p:spPr bwMode="auto">
+          <a:xfrm>
+            <a:off x="2221365" y="3416085"/>
+            <a:ext cx="1092629" cy="1092629"/>
+          </a:xfrm>
+          <a:prstGeom prst="rect">
+            <a:avLst/>
+          </a:prstGeom>
+          <a:noFill/>
+          <a:extLst>
+            <a:ext uri="{909E8E84-426E-40DD-AFC4-6F175D3DCCD1}">
+              <a14:hiddenFill xmlns:a14="http://schemas.microsoft.com/office/drawing/2010/main">
+                <a:solidFill>
+                  <a:srgbClr val="FFFFFF"/>
+                </a:solidFill>
+              </a14:hiddenFill>
+            </a:ext>
+          </a:extLst>
+        </p:spPr>
+      </p:pic>
     </p:spTree>
     <p:extLst>
       <p:ext uri="{BB962C8B-B14F-4D97-AF65-F5344CB8AC3E}">
@@ -8571,7 +8822,7 @@
                 <a:cs typeface="Libre Baskerville"/>
                 <a:sym typeface="Libre Baskerville"/>
               </a:rPr>
-              <a:t>“The greatest challenge to any thinker is stating the problem in a way that will allow a solution”</a:t>
+              <a:t>“Aussi bien que je comprenne, ma compréhension ne peut représenter qu’une infime fraction de tout ce que je souhaite comprendre”</a:t>
             </a:r>
             <a:endParaRPr sz="3200" b="0" i="0" u="none" strike="noStrike" cap="none" dirty="0">
               <a:solidFill>
@@ -8641,7 +8892,7 @@
                 <a:cs typeface="Inter"/>
                 <a:sym typeface="Inter"/>
               </a:rPr>
-              <a:t>Bertrand RUSSELL, British philosopher</a:t>
+              <a:t>Ada LOVELACE, mathématicienne et scientifique britannique</a:t>
             </a:r>
             <a:endParaRPr sz="1000" b="0" i="0" u="none" strike="noStrike" cap="none" dirty="0">
               <a:solidFill>
@@ -8759,7 +9010,7 @@
                 <a:cs typeface="Inter"/>
                 <a:sym typeface="Inter"/>
               </a:rPr>
-              <a:t>Thank you! </a:t>
+              <a:t>Merci! </a:t>
             </a:r>
             <a:endParaRPr sz="5600" b="1" dirty="0">
               <a:solidFill>
@@ -8845,7 +9096,7 @@
                 <a:cs typeface="Inter Medium"/>
                 <a:sym typeface="Inter Medium"/>
               </a:rPr>
-              <a:t>Do you have any questions ?</a:t>
+              <a:t>Avez-vous des questions?</a:t>
             </a:r>
             <a:endParaRPr sz="2400" dirty="0">
               <a:solidFill>
@@ -8932,8 +9183,8 @@
         </p:nvSpPr>
         <p:spPr>
           <a:xfrm>
-            <a:off x="1040272" y="1702749"/>
-            <a:ext cx="7189328" cy="2241569"/>
+            <a:off x="589349" y="1377284"/>
+            <a:ext cx="7996712" cy="3473685"/>
           </a:xfrm>
           <a:prstGeom prst="rect">
             <a:avLst/>
@@ -8956,7 +9207,7 @@
                 <a:cs typeface="Inter SemiBold"/>
                 <a:sym typeface="Inter SemiBold"/>
               </a:rPr>
-              <a:t>GETAROUND Project</a:t>
+              <a:t>Projet GETAROUND</a:t>
             </a:r>
             <a:br>
               <a:rPr lang="fr" sz="3600" dirty="0">
@@ -8970,6 +9221,24 @@
               </a:rPr>
             </a:br>
             <a:br>
+              <a:rPr lang="fr" sz="3600" dirty="0">
+                <a:solidFill>
+                  <a:srgbClr val="0E3449"/>
+                </a:solidFill>
+                <a:latin typeface="Inter SemiBold"/>
+                <a:ea typeface="Inter SemiBold"/>
+                <a:cs typeface="Inter SemiBold"/>
+                <a:sym typeface="Inter SemiBold"/>
+              </a:rPr>
+            </a:br>
+            <a:r>
+              <a:rPr lang="fr-FR" sz="2400" dirty="0"/>
+              <a:t>Industrialisation d'un algorithme d'apprentissage automatique et automatisation des processus de décision</a:t>
+            </a:r>
+            <a:br>
+              <a:rPr lang="fr-FR" sz="2400" dirty="0"/>
+            </a:br>
+            <a:br>
               <a:rPr lang="fr" sz="4800" dirty="0">
                 <a:solidFill>
                   <a:srgbClr val="0E3449"/>
@@ -8981,8 +9250,16 @@
               </a:rPr>
             </a:br>
             <a:r>
-              <a:rPr lang="en-US" sz="3200" dirty="0"/>
-              <a:t>Deployment</a:t>
+              <a:rPr lang="en-US" sz="2400" dirty="0"/>
+              <a:t>(</a:t>
+            </a:r>
+            <a:r>
+              <a:rPr lang="en-US" sz="2400" dirty="0" err="1"/>
+              <a:t>Déploiement</a:t>
+            </a:r>
+            <a:r>
+              <a:rPr lang="en-US" sz="2400" dirty="0"/>
+              <a:t>)</a:t>
             </a:r>
             <a:br>
               <a:rPr lang="en-US" sz="4800" dirty="0">
@@ -9033,6 +9310,53 @@
           <a:ln>
             <a:noFill/>
           </a:ln>
+        </p:spPr>
+      </p:pic>
+      <p:pic>
+        <p:nvPicPr>
+          <p:cNvPr id="1026" name="Picture 2" descr="snap">
+            <a:extLst>
+              <a:ext uri="{FF2B5EF4-FFF2-40B4-BE49-F238E27FC236}">
+                <a16:creationId xmlns:a16="http://schemas.microsoft.com/office/drawing/2014/main" id="{F3A42B12-F102-71A7-D60F-629BB24A96FB}"/>
+              </a:ext>
+            </a:extLst>
+          </p:cNvPr>
+          <p:cNvPicPr>
+            <a:picLocks noChangeAspect="1" noChangeArrowheads="1"/>
+          </p:cNvPicPr>
+          <p:nvPr/>
+        </p:nvPicPr>
+        <p:blipFill>
+          <a:blip r:embed="rId4">
+            <a:extLst>
+              <a:ext uri="{28A0092B-C50C-407E-A947-70E740481C1C}">
+                <a14:useLocalDpi xmlns:a14="http://schemas.microsoft.com/office/drawing/2010/main" val="0"/>
+              </a:ext>
+            </a:extLst>
+          </a:blip>
+          <a:srcRect/>
+          <a:stretch>
+            <a:fillRect/>
+          </a:stretch>
+        </p:blipFill>
+        <p:spPr bwMode="auto">
+          <a:xfrm>
+            <a:off x="4487173" y="0"/>
+            <a:ext cx="5012871" cy="1841534"/>
+          </a:xfrm>
+          <a:prstGeom prst="rect">
+            <a:avLst/>
+          </a:prstGeom>
+          <a:noFill/>
+          <a:extLst>
+            <a:ext uri="{909E8E84-426E-40DD-AFC4-6F175D3DCCD1}">
+              <a14:hiddenFill xmlns:a14="http://schemas.microsoft.com/office/drawing/2010/main">
+                <a:solidFill>
+                  <a:srgbClr val="FFFFFF"/>
+                </a:solidFill>
+              </a14:hiddenFill>
+            </a:ext>
+          </a:extLst>
         </p:spPr>
       </p:pic>
     </p:spTree>
@@ -9088,7 +9412,11 @@
             <a:pPr lvl="0"/>
             <a:r>
               <a:rPr lang="en-US" sz="2400" dirty="0"/>
-              <a:t>Project Overview</a:t>
+              <a:t>Aperçu du </a:t>
+            </a:r>
+            <a:r>
+              <a:rPr lang="en-US" sz="2400" dirty="0" err="1"/>
+              <a:t>projet</a:t>
             </a:r>
             <a:endParaRPr sz="2500" dirty="0">
               <a:solidFill>
@@ -9132,15 +9460,15 @@
               <a:buNone/>
             </a:pPr>
             <a:r>
-              <a:rPr lang="en-US" dirty="0">
+              <a:rPr lang="fr-FR" noProof="0" dirty="0">
                 <a:solidFill>
                   <a:schemeClr val="tx1"/>
                 </a:solidFill>
               </a:rPr>
-              <a:t>This project addresses three key challenges in </a:t>
-            </a:r>
-            <a:r>
-              <a:rPr lang="en-US" dirty="0" err="1">
+              <a:t>Ce projet traite trois notions clés relatives à la plateforme de location des voitures </a:t>
+            </a:r>
+            <a:r>
+              <a:rPr lang="fr-FR" noProof="0" dirty="0" err="1">
                 <a:solidFill>
                   <a:schemeClr val="tx1"/>
                 </a:solidFill>
@@ -9148,19 +9476,14 @@
               <a:t>Getaround</a:t>
             </a:r>
             <a:r>
-              <a:rPr lang="en-US" dirty="0">
+              <a:rPr lang="fr-FR" noProof="0" dirty="0">
                 <a:solidFill>
                   <a:schemeClr val="tx1"/>
                 </a:solidFill>
               </a:rPr>
-              <a:t> car rental platform:</a:t>
-            </a:r>
-          </a:p>
-          <a:p>
-            <a:pPr marL="114300" indent="0">
-              <a:buNone/>
-            </a:pPr>
-            <a:endParaRPr lang="en-US" sz="1800" dirty="0">
+              <a:t>:</a:t>
+            </a:r>
+            <a:endParaRPr lang="fr-FR" sz="1800" noProof="0" dirty="0">
               <a:solidFill>
                 <a:schemeClr val="tx1"/>
               </a:solidFill>
@@ -9169,63 +9492,60 @@
           <a:p>
             <a:pPr lvl="1"/>
             <a:r>
-              <a:rPr lang="en-US" sz="1800" b="1" dirty="0">
+              <a:rPr lang="fr-FR" sz="1800" b="1" noProof="0" dirty="0">
                 <a:solidFill>
                   <a:schemeClr val="tx1"/>
                 </a:solidFill>
               </a:rPr>
-              <a:t>Delay Analysis</a:t>
-            </a:r>
-            <a:r>
-              <a:rPr lang="en-US" sz="1800" dirty="0">
+              <a:t>Analyse des retards</a:t>
+            </a:r>
+            <a:r>
+              <a:rPr lang="fr-FR" sz="1800" noProof="0" dirty="0">
                 <a:solidFill>
                   <a:schemeClr val="tx1"/>
                 </a:solidFill>
               </a:rPr>
-              <a:t>: Understanding how late returns affect future rentals</a:t>
+              <a:t>: comprendre comment les retards affectent les futures locations</a:t>
             </a:r>
           </a:p>
           <a:p>
             <a:pPr lvl="1"/>
             <a:r>
-              <a:rPr lang="en-US" sz="1800" b="1" dirty="0">
+              <a:rPr lang="fr-FR" sz="1800" b="1" noProof="0" dirty="0">
                 <a:solidFill>
                   <a:schemeClr val="tx1"/>
                 </a:solidFill>
               </a:rPr>
-              <a:t>Price Optimization</a:t>
-            </a:r>
-            <a:r>
-              <a:rPr lang="en-US" sz="1800" dirty="0">
+              <a:t>Optimisation des tarifs de location</a:t>
+            </a:r>
+            <a:r>
+              <a:rPr lang="fr-FR" sz="1800" noProof="0" dirty="0">
                 <a:solidFill>
                   <a:schemeClr val="tx1"/>
                 </a:solidFill>
               </a:rPr>
-              <a:t>: ML-powered dynamic pricing based on car specifications</a:t>
+              <a:t>: tarification dynamique basée sur les caractéristiques des voitures calculée avec un algorithme de l’IA</a:t>
             </a:r>
           </a:p>
           <a:p>
             <a:pPr lvl="1"/>
             <a:r>
-              <a:rPr lang="en-US" sz="1800" b="1" dirty="0">
+              <a:rPr lang="fr-FR" sz="1800" b="1" noProof="0" dirty="0">
                 <a:solidFill>
                   <a:schemeClr val="tx1"/>
                 </a:solidFill>
               </a:rPr>
-              <a:t>Experiment Tracking</a:t>
-            </a:r>
-            <a:r>
-              <a:rPr lang="en-US" sz="1800" dirty="0">
+              <a:t>Suivi du modèle de l’IA</a:t>
+            </a:r>
+            <a:r>
+              <a:rPr lang="fr-FR" sz="1800" noProof="0" dirty="0">
                 <a:solidFill>
                   <a:schemeClr val="tx1"/>
                 </a:solidFill>
               </a:rPr>
-              <a:t>: ML development with versioning and monitoring</a:t>
-            </a:r>
-            <a:endParaRPr lang="en-US" sz="1800" dirty="0"/>
-          </a:p>
-          <a:p>
-            <a:endParaRPr lang="fr-FR" b="1" dirty="0"/>
+              <a:t>: développement de ML avec versionnage et surveillance</a:t>
+            </a:r>
+            <a:endParaRPr lang="fr-FR" b="1" noProof="0" dirty="0"/>
           </a:p>
         </p:txBody>
       </p:sp>
@@ -9408,8 +9728,8 @@
         </p:nvSpPr>
         <p:spPr>
           <a:xfrm>
-            <a:off x="390598" y="1138675"/>
-            <a:ext cx="3306007" cy="3458100"/>
+            <a:off x="323652" y="1642370"/>
+            <a:ext cx="3306007" cy="2108220"/>
           </a:xfrm>
           <a:prstGeom prst="rect">
             <a:avLst/>
@@ -9426,28 +9746,22 @@
           <a:lstStyle/>
           <a:p>
             <a:r>
-              <a:rPr lang="en-US" b="1" dirty="0"/>
-              <a:t>Delay Analysis</a:t>
-            </a:r>
-            <a:r>
-              <a:rPr lang="en-US" dirty="0"/>
-              <a:t>:</a:t>
-            </a:r>
-            <a:br>
-              <a:rPr lang="en-US" dirty="0"/>
-            </a:br>
-            <a:br>
-              <a:rPr lang="en-US" dirty="0"/>
-            </a:br>
-            <a:r>
-              <a:rPr lang="en-US" dirty="0"/>
-              <a:t>Data analysis for Interactive simulation tool</a:t>
-            </a:r>
-            <a:br>
-              <a:rPr lang="en-US" dirty="0"/>
-            </a:br>
-            <a:br>
-              <a:rPr lang="fr" sz="2400" dirty="0">
+              <a:rPr lang="fr-FR" b="1" noProof="0" dirty="0"/>
+              <a:t>Analyse des retards</a:t>
+            </a:r>
+            <a:r>
+              <a:rPr lang="fr-FR" b="1" dirty="0"/>
+              <a:t> </a:t>
+            </a:r>
+            <a:r>
+              <a:rPr lang="fr-FR" b="1" noProof="0" dirty="0"/>
+              <a:t>en vue d’un outil interactif</a:t>
+            </a:r>
+            <a:br>
+              <a:rPr lang="fr-FR" noProof="0" dirty="0"/>
+            </a:br>
+            <a:br>
+              <a:rPr lang="fr-FR" sz="2400" noProof="0" dirty="0">
                 <a:solidFill>
                   <a:srgbClr val="015955"/>
                 </a:solidFill>
@@ -9458,7 +9772,7 @@
               </a:rPr>
             </a:br>
             <a:br>
-              <a:rPr lang="fr" sz="2400" dirty="0">
+              <a:rPr lang="fr-FR" sz="2400" noProof="0" dirty="0">
                 <a:solidFill>
                   <a:srgbClr val="015955"/>
                 </a:solidFill>
@@ -9468,7 +9782,7 @@
                 <a:sym typeface="Inter"/>
               </a:rPr>
             </a:br>
-            <a:endParaRPr sz="2400" dirty="0">
+            <a:endParaRPr lang="fr-FR" sz="2400" noProof="0" dirty="0">
               <a:solidFill>
                 <a:srgbClr val="015955"/>
               </a:solidFill>
@@ -9531,8 +9845,8 @@
         </p:nvSpPr>
         <p:spPr>
           <a:xfrm>
-            <a:off x="3753295" y="588485"/>
-            <a:ext cx="5315100" cy="3642552"/>
+            <a:off x="3818233" y="184409"/>
+            <a:ext cx="5240526" cy="3642552"/>
           </a:xfrm>
           <a:prstGeom prst="rect">
             <a:avLst/>
@@ -9549,61 +9863,69 @@
           <a:lstStyle/>
           <a:p>
             <a:r>
-              <a:rPr lang="en-US" sz="1800" dirty="0"/>
-              <a:t>Understanding the business context of the given data through an exploratory data analysis:</a:t>
-            </a:r>
-            <a:br>
-              <a:rPr lang="en-US" sz="1800" dirty="0"/>
-            </a:br>
-            <a:br>
-              <a:rPr lang="en-US" sz="1800" dirty="0"/>
-            </a:br>
-            <a:r>
-              <a:rPr lang="en-US" sz="1600" dirty="0"/>
-              <a:t>- Analysis of delays in car returns and conflicts</a:t>
-            </a:r>
-            <a:br>
-              <a:rPr lang="en-US" sz="1600" dirty="0"/>
-            </a:br>
-            <a:br>
-              <a:rPr lang="en-US" sz="1600" dirty="0"/>
-            </a:br>
-            <a:r>
-              <a:rPr lang="en-US" sz="1600" dirty="0"/>
-              <a:t>- Simulating minimum thresholds of delay for better decision-making</a:t>
-            </a:r>
-            <a:br>
-              <a:rPr lang="en-US" sz="1600" dirty="0"/>
-            </a:br>
-            <a:br>
-              <a:rPr lang="en-US" sz="1600" dirty="0"/>
-            </a:br>
-            <a:r>
-              <a:rPr lang="en-US" sz="1600" dirty="0"/>
-              <a:t>- Conclusions: implementation of a minimum delay between two rentals to mitigate conflicts is necessary, the simulation tool will help choose the optimal delay</a:t>
-            </a:r>
-            <a:br>
-              <a:rPr lang="en-US" sz="1800" dirty="0"/>
-            </a:br>
-            <a:br>
-              <a:rPr lang="en-US" sz="1800" dirty="0"/>
-            </a:br>
-            <a:br>
-              <a:rPr lang="en-US" sz="1800" dirty="0"/>
-            </a:br>
-            <a:br>
-              <a:rPr lang="en-US" sz="1600" dirty="0"/>
-            </a:br>
-            <a:br>
-              <a:rPr lang="en-US" sz="1600" dirty="0"/>
-            </a:br>
-            <a:br>
-              <a:rPr lang="en-US" dirty="0"/>
-            </a:br>
-            <a:br>
-              <a:rPr lang="fr-FR" dirty="0"/>
-            </a:br>
-            <a:endParaRPr lang="en-US" sz="1600" dirty="0"/>
+              <a:rPr lang="fr-FR" sz="1800" noProof="0" dirty="0"/>
+              <a:t>Comprendre le contexte commercial des données grâce à l’analyse exploratoire:</a:t>
+            </a:r>
+            <a:br>
+              <a:rPr lang="fr-FR" sz="1800" noProof="0" dirty="0"/>
+            </a:br>
+            <a:br>
+              <a:rPr lang="fr-FR" sz="1800" noProof="0" dirty="0"/>
+            </a:br>
+            <a:r>
+              <a:rPr lang="fr-FR" sz="1600" noProof="0" dirty="0"/>
+              <a:t>- Retards en restitution des voitures causent des conflits</a:t>
+            </a:r>
+            <a:br>
+              <a:rPr lang="fr-FR" sz="1600" noProof="0" dirty="0"/>
+            </a:br>
+            <a:br>
+              <a:rPr lang="fr-FR" sz="1600" noProof="0" dirty="0"/>
+            </a:br>
+            <a:r>
+              <a:rPr lang="fr-FR" sz="1600" noProof="0" dirty="0"/>
+              <a:t>- Simulation des seuils minimum de décalage pour améliorer le processus décisif</a:t>
+            </a:r>
+            <a:br>
+              <a:rPr lang="fr-FR" sz="1600" noProof="0" dirty="0"/>
+            </a:br>
+            <a:br>
+              <a:rPr lang="fr-FR" sz="1600" noProof="0" dirty="0"/>
+            </a:br>
+            <a:r>
+              <a:rPr lang="fr-FR" sz="1600" noProof="0" dirty="0"/>
+              <a:t>- Conclusions: mise </a:t>
+            </a:r>
+            <a:r>
+              <a:rPr lang="fr-FR" sz="1600" dirty="0"/>
+              <a:t>e</a:t>
+            </a:r>
+            <a:r>
+              <a:rPr lang="fr-FR" sz="1600" noProof="0" dirty="0"/>
+              <a:t>n place d’un décalage minimum entre deux locations pour réduire les conflits est nécessaire, le simulateur permettra de choisir le meilleur seuil</a:t>
+            </a:r>
+            <a:br>
+              <a:rPr lang="fr-FR" sz="1800" noProof="0" dirty="0"/>
+            </a:br>
+            <a:br>
+              <a:rPr lang="fr-FR" sz="1800" noProof="0" dirty="0"/>
+            </a:br>
+            <a:br>
+              <a:rPr lang="fr-FR" sz="1800" noProof="0" dirty="0"/>
+            </a:br>
+            <a:br>
+              <a:rPr lang="fr-FR" sz="1600" noProof="0" dirty="0"/>
+            </a:br>
+            <a:br>
+              <a:rPr lang="fr-FR" sz="1600" noProof="0" dirty="0"/>
+            </a:br>
+            <a:br>
+              <a:rPr lang="fr-FR" noProof="0" dirty="0"/>
+            </a:br>
+            <a:br>
+              <a:rPr lang="fr-FR" noProof="0" dirty="0"/>
+            </a:br>
+            <a:endParaRPr lang="fr-FR" sz="1600" noProof="0" dirty="0"/>
           </a:p>
         </p:txBody>
       </p:sp>
@@ -9636,7 +9958,7 @@
         </p:blipFill>
         <p:spPr bwMode="auto">
           <a:xfrm>
-            <a:off x="6532353" y="3442359"/>
+            <a:off x="6595637" y="3544743"/>
             <a:ext cx="2221049" cy="1414348"/>
           </a:xfrm>
           <a:prstGeom prst="rect">
@@ -9683,7 +10005,7 @@
         </p:blipFill>
         <p:spPr bwMode="auto">
           <a:xfrm>
-            <a:off x="3753294" y="3484119"/>
+            <a:off x="3696606" y="3544743"/>
             <a:ext cx="2521884" cy="1372588"/>
           </a:xfrm>
           <a:prstGeom prst="rect">
@@ -9799,8 +10121,8 @@
         </p:nvSpPr>
         <p:spPr>
           <a:xfrm>
-            <a:off x="296742" y="1115427"/>
-            <a:ext cx="3306007" cy="3458100"/>
+            <a:off x="248979" y="1677202"/>
+            <a:ext cx="3306007" cy="2232207"/>
           </a:xfrm>
           <a:prstGeom prst="rect">
             <a:avLst/>
@@ -9818,50 +10140,28 @@
           <a:p>
             <a:pPr lvl="0"/>
             <a:r>
-              <a:rPr lang="en-US" sz="2400" b="1" dirty="0"/>
-              <a:t>Delay Threshold Optimization</a:t>
-            </a:r>
-            <a:r>
-              <a:rPr lang="en-US" sz="2400" dirty="0"/>
+              <a:rPr lang="fr-FR" sz="2400" b="1" noProof="0" dirty="0"/>
+              <a:t>Optimisation du seuil de décalage</a:t>
+            </a:r>
+            <a:r>
+              <a:rPr lang="fr-FR" sz="2400" noProof="0" dirty="0"/>
               <a:t>:</a:t>
             </a:r>
             <a:br>
-              <a:rPr lang="en-US" sz="2400" dirty="0"/>
-            </a:br>
-            <a:br>
-              <a:rPr lang="en-US" sz="2400" b="1" dirty="0"/>
-            </a:br>
-            <a:r>
-              <a:rPr lang="en-US" sz="2400" b="1" dirty="0"/>
-              <a:t>Interactive</a:t>
-            </a:r>
-            <a:br>
-              <a:rPr lang="en-US" sz="2400" b="1" dirty="0"/>
-            </a:br>
-            <a:r>
-              <a:rPr lang="en-US" sz="2400" b="1" dirty="0" err="1"/>
-              <a:t>Streamlit</a:t>
-            </a:r>
-            <a:r>
-              <a:rPr lang="en-US" sz="2400" b="1" dirty="0"/>
-              <a:t> Dashboard</a:t>
-            </a:r>
-            <a:br>
-              <a:rPr lang="en-US" sz="2400" b="1" dirty="0"/>
-            </a:br>
-            <a:r>
-              <a:rPr lang="en-US" sz="2400" b="1" dirty="0"/>
-              <a:t>deployed on </a:t>
-            </a:r>
-            <a:br>
-              <a:rPr lang="en-US" sz="2400" b="1" dirty="0"/>
-            </a:br>
-            <a:r>
-              <a:rPr lang="en-US" sz="2400" b="1" dirty="0"/>
-              <a:t>Hugging Face</a:t>
-            </a:r>
-            <a:br>
-              <a:rPr lang="fr" sz="2400" dirty="0">
+              <a:rPr lang="fr-FR" sz="2400" noProof="0" dirty="0"/>
+            </a:br>
+            <a:br>
+              <a:rPr lang="fr-FR" sz="2400" b="1" noProof="0" dirty="0"/>
+            </a:br>
+            <a:r>
+              <a:rPr lang="fr-FR" sz="2400" b="1" noProof="0" dirty="0"/>
+              <a:t>outil de simulation interactif</a:t>
+            </a:r>
+            <a:br>
+              <a:rPr lang="fr-FR" sz="2400" b="1" noProof="0" dirty="0"/>
+            </a:br>
+            <a:br>
+              <a:rPr lang="fr-FR" sz="2400" noProof="0" dirty="0">
                 <a:solidFill>
                   <a:srgbClr val="015955"/>
                 </a:solidFill>
@@ -9872,7 +10172,7 @@
               </a:rPr>
             </a:br>
             <a:br>
-              <a:rPr lang="fr" sz="2400" dirty="0">
+              <a:rPr lang="fr-FR" sz="2400" noProof="0" dirty="0">
                 <a:solidFill>
                   <a:srgbClr val="015955"/>
                 </a:solidFill>
@@ -9882,7 +10182,7 @@
                 <a:sym typeface="Inter"/>
               </a:rPr>
             </a:br>
-            <a:endParaRPr sz="2400" dirty="0">
+            <a:endParaRPr lang="fr-FR" sz="2400" noProof="0" dirty="0">
               <a:solidFill>
                 <a:srgbClr val="015955"/>
               </a:solidFill>
@@ -9933,8 +10233,8 @@
         </p:nvSpPr>
         <p:spPr>
           <a:xfrm>
-            <a:off x="3925833" y="605285"/>
-            <a:ext cx="5056796" cy="3036817"/>
+            <a:off x="3893991" y="287570"/>
+            <a:ext cx="5056796" cy="2564117"/>
           </a:xfrm>
           <a:prstGeom prst="rect">
             <a:avLst/>
@@ -9951,67 +10251,75 @@
           <a:lstStyle/>
           <a:p>
             <a:r>
-              <a:rPr lang="en-US" sz="2000" b="1" dirty="0"/>
-              <a:t>Features</a:t>
-            </a:r>
-            <a:r>
-              <a:rPr lang="en-US" sz="2000" dirty="0"/>
+              <a:rPr lang="fr-FR" sz="2000" b="1" noProof="0" dirty="0"/>
+              <a:t>Caractéristiques</a:t>
+            </a:r>
+            <a:r>
+              <a:rPr lang="fr-FR" sz="2000" noProof="0" dirty="0"/>
               <a:t>:</a:t>
             </a:r>
             <a:br>
-              <a:rPr lang="en-US" sz="2000" dirty="0"/>
-            </a:br>
-            <a:br>
-              <a:rPr lang="en-US" sz="2000" dirty="0"/>
-            </a:br>
-            <a:r>
-              <a:rPr lang="en-US" sz="2000" dirty="0"/>
-              <a:t>- Interactive threshold simulation (15-600 minutes)</a:t>
-            </a:r>
-            <a:br>
-              <a:rPr lang="en-US" sz="2000" dirty="0"/>
-            </a:br>
-            <a:r>
-              <a:rPr lang="en-US" sz="2000" dirty="0"/>
-              <a:t>- Connect vs All Cars scope selection</a:t>
-            </a:r>
-            <a:br>
-              <a:rPr lang="en-US" sz="2000" dirty="0"/>
-            </a:br>
-            <a:r>
-              <a:rPr lang="en-US" sz="2000" dirty="0"/>
-              <a:t>- Real-time conflict analysis</a:t>
-            </a:r>
-            <a:br>
-              <a:rPr lang="en-US" sz="2000" dirty="0"/>
-            </a:br>
-            <a:r>
-              <a:rPr lang="en-US" sz="2000" dirty="0"/>
-              <a:t>- Visualization of the delay distribution</a:t>
-            </a:r>
-            <a:br>
-              <a:rPr lang="en-US" sz="2000" dirty="0"/>
-            </a:br>
-            <a:r>
-              <a:rPr lang="en-US" sz="2000" dirty="0"/>
-              <a:t>- Business insights and recommendations</a:t>
-            </a:r>
-            <a:br>
-              <a:rPr lang="en-US" dirty="0"/>
-            </a:br>
-            <a:br>
-              <a:rPr lang="en-US" sz="1600" dirty="0"/>
-            </a:br>
-            <a:br>
-              <a:rPr lang="en-US" sz="1600" dirty="0"/>
-            </a:br>
-            <a:br>
-              <a:rPr lang="en-US" dirty="0"/>
-            </a:br>
-            <a:br>
-              <a:rPr lang="fr-FR" dirty="0"/>
-            </a:br>
-            <a:endParaRPr lang="en-US" sz="1600" dirty="0"/>
+              <a:rPr lang="fr-FR" sz="2000" noProof="0" dirty="0"/>
+            </a:br>
+            <a:br>
+              <a:rPr lang="fr-FR" sz="2000" noProof="0" dirty="0"/>
+            </a:br>
+            <a:r>
+              <a:rPr lang="fr-FR" sz="2000" noProof="0" dirty="0"/>
+              <a:t>- Simulation interactive du seuil</a:t>
+            </a:r>
+            <a:br>
+              <a:rPr lang="fr-FR" sz="2000" noProof="0" dirty="0"/>
+            </a:br>
+            <a:r>
+              <a:rPr lang="fr-FR" sz="2000" noProof="0" dirty="0"/>
+              <a:t>- Sélection des </a:t>
+            </a:r>
+            <a:r>
+              <a:rPr lang="fr-FR" sz="2000" dirty="0"/>
+              <a:t>modes de location: </a:t>
+            </a:r>
+            <a:r>
+              <a:rPr lang="fr-FR" sz="2000" noProof="0" dirty="0" err="1"/>
+              <a:t>Connect</a:t>
+            </a:r>
+            <a:r>
+              <a:rPr lang="fr-FR" sz="2000" noProof="0" dirty="0"/>
+              <a:t> vs All Cars</a:t>
+            </a:r>
+            <a:br>
+              <a:rPr lang="fr-FR" sz="2000" noProof="0" dirty="0"/>
+            </a:br>
+            <a:r>
+              <a:rPr lang="fr-FR" sz="2000" noProof="0" dirty="0"/>
+              <a:t>- Analyse des conflits en temps réel</a:t>
+            </a:r>
+            <a:br>
+              <a:rPr lang="fr-FR" sz="2000" noProof="0" dirty="0"/>
+            </a:br>
+            <a:r>
+              <a:rPr lang="fr-FR" sz="2000" noProof="0" dirty="0"/>
+              <a:t>- Visualisation de la distribution des retards</a:t>
+            </a:r>
+            <a:br>
+              <a:rPr lang="fr-FR" sz="2000" noProof="0" dirty="0"/>
+            </a:br>
+            <a:br>
+              <a:rPr lang="fr-FR" noProof="0" dirty="0"/>
+            </a:br>
+            <a:br>
+              <a:rPr lang="fr-FR" sz="1600" noProof="0" dirty="0"/>
+            </a:br>
+            <a:br>
+              <a:rPr lang="fr-FR" sz="1600" noProof="0" dirty="0"/>
+            </a:br>
+            <a:br>
+              <a:rPr lang="fr-FR" noProof="0" dirty="0"/>
+            </a:br>
+            <a:br>
+              <a:rPr lang="fr-FR" noProof="0" dirty="0"/>
+            </a:br>
+            <a:endParaRPr lang="fr-FR" sz="1600" noProof="0" dirty="0"/>
           </a:p>
         </p:txBody>
       </p:sp>
@@ -10037,8 +10345,8 @@
         </p:blipFill>
         <p:spPr>
           <a:xfrm>
-            <a:off x="4572000" y="3218228"/>
-            <a:ext cx="3276931" cy="1925197"/>
+            <a:off x="4572000" y="2851687"/>
+            <a:ext cx="3600756" cy="2115444"/>
           </a:xfrm>
           <a:prstGeom prst="rect">
             <a:avLst/>
@@ -10156,8 +10464,8 @@
         </p:nvSpPr>
         <p:spPr>
           <a:xfrm>
-            <a:off x="390598" y="1138675"/>
-            <a:ext cx="3306007" cy="3458100"/>
+            <a:off x="132295" y="1723621"/>
+            <a:ext cx="3436304" cy="1933979"/>
           </a:xfrm>
           <a:prstGeom prst="rect">
             <a:avLst/>
@@ -10175,33 +10483,18 @@
           <a:p>
             <a:pPr lvl="0"/>
             <a:r>
-              <a:rPr lang="en-US" sz="2400" b="1" dirty="0"/>
-              <a:t>Delay Threshold Optimization</a:t>
-            </a:r>
-            <a:r>
+              <a:rPr lang="fr-FR" sz="2400" b="1" dirty="0"/>
+              <a:t>Optimisation du seuil de décalage - </a:t>
+            </a:r>
+            <a:br>
               <a:rPr lang="en-US" sz="2400" dirty="0"/>
-              <a:t>:</a:t>
-            </a:r>
-            <a:br>
-              <a:rPr lang="en-US" sz="2400" dirty="0"/>
-            </a:br>
-            <a:br>
-              <a:rPr lang="en-US" sz="2400" b="1" dirty="0"/>
-            </a:br>
-            <a:r>
-              <a:rPr lang="en-US" sz="2400" b="1" dirty="0"/>
-              <a:t>Interactive</a:t>
-            </a:r>
-            <a:br>
-              <a:rPr lang="en-US" sz="2400" b="1" dirty="0"/>
-            </a:br>
-            <a:r>
-              <a:rPr lang="en-US" sz="2400" b="1" dirty="0" err="1"/>
-              <a:t>Streamlit</a:t>
-            </a:r>
-            <a:r>
-              <a:rPr lang="en-US" sz="2400" b="1" dirty="0"/>
-              <a:t> Dashboard – Potential business insights</a:t>
+            </a:br>
+            <a:br>
+              <a:rPr lang="fr-FR" sz="2400" b="1" dirty="0"/>
+            </a:br>
+            <a:r>
+              <a:rPr lang="fr-FR" sz="2400" b="1" dirty="0"/>
+              <a:t>stratégie commerciale</a:t>
             </a:r>
             <a:br>
               <a:rPr lang="fr" sz="2400" dirty="0">
@@ -10288,8 +10581,8 @@
         </p:nvSpPr>
         <p:spPr>
           <a:xfrm>
-            <a:off x="3696605" y="362273"/>
-            <a:ext cx="5315100" cy="3642552"/>
+            <a:off x="3696605" y="791263"/>
+            <a:ext cx="5315100" cy="4020959"/>
           </a:xfrm>
           <a:prstGeom prst="rect">
             <a:avLst/>
@@ -10305,106 +10598,105 @@
           </a:bodyPr>
           <a:lstStyle/>
           <a:p>
-            <a:r>
-              <a:rPr lang="en-US" sz="1800" b="1" dirty="0"/>
-              <a:t>Example threshold: 60 minutes</a:t>
-            </a:r>
-            <a:br>
-              <a:rPr lang="en-US" sz="1800" dirty="0"/>
-            </a:br>
-            <a:br>
-              <a:rPr lang="en-US" sz="1800" dirty="0"/>
-            </a:br>
-            <a:r>
-              <a:rPr lang="en-US" sz="1800" dirty="0"/>
-              <a:t>Conflicts prevented: </a:t>
-            </a:r>
-            <a:r>
-              <a:rPr lang="en-US" sz="1800" b="1" dirty="0"/>
-              <a:t>176</a:t>
-            </a:r>
-            <a:r>
-              <a:rPr lang="en-US" sz="1800" dirty="0"/>
-              <a:t> rentals</a:t>
-            </a:r>
-            <a:br>
-              <a:rPr lang="en-US" sz="1800" dirty="0"/>
-            </a:br>
-            <a:r>
-              <a:rPr lang="en-US" sz="1800" dirty="0"/>
-              <a:t>All cars scope: </a:t>
-            </a:r>
-            <a:r>
-              <a:rPr lang="en-US" sz="1800" b="1" dirty="0"/>
-              <a:t>176</a:t>
-            </a:r>
-            <a:r>
-              <a:rPr lang="en-US" sz="1800" dirty="0"/>
-              <a:t> conflicts</a:t>
-            </a:r>
-            <a:br>
-              <a:rPr lang="en-US" sz="1800" dirty="0"/>
-            </a:br>
-            <a:r>
-              <a:rPr lang="en-US" sz="1800" dirty="0"/>
-              <a:t>Connect only scope: </a:t>
-            </a:r>
-            <a:r>
-              <a:rPr lang="en-US" sz="1800" b="1" dirty="0"/>
-              <a:t>63</a:t>
-            </a:r>
-            <a:r>
-              <a:rPr lang="en-US" sz="1800" dirty="0"/>
-              <a:t> conflicts</a:t>
-            </a:r>
-            <a:br>
-              <a:rPr lang="en-US" sz="1800" dirty="0"/>
-            </a:br>
-            <a:br>
-              <a:rPr lang="en-US" sz="1800" dirty="0"/>
-            </a:br>
-            <a:r>
-              <a:rPr lang="en-US" sz="1800" dirty="0"/>
-              <a:t>Connect cars show </a:t>
-            </a:r>
-            <a:r>
-              <a:rPr lang="en-US" sz="1800" b="1" dirty="0"/>
-              <a:t>64.2%</a:t>
-            </a:r>
-            <a:r>
-              <a:rPr lang="en-US" sz="1800" dirty="0"/>
-              <a:t> fewer conflicts</a:t>
-            </a:r>
-            <a:br>
-              <a:rPr lang="en-US" sz="1800" dirty="0"/>
-            </a:br>
-            <a:br>
-              <a:rPr lang="en-US" sz="1800" dirty="0"/>
-            </a:br>
-            <a:r>
-              <a:rPr lang="en-US" sz="1800" b="1" dirty="0"/>
-              <a:t>Trade-off Consideration:</a:t>
-            </a:r>
-            <a:r>
-              <a:rPr lang="en-US" sz="1800" dirty="0"/>
-              <a:t> A 60-minute buffer prevents conflicts but may reduce booking flexibility. A balance between customer satisfaction and revenue optimization must be considered.</a:t>
-            </a:r>
-            <a:br>
-              <a:rPr lang="en-US" dirty="0"/>
-            </a:br>
-            <a:br>
-              <a:rPr lang="en-US" sz="1600" dirty="0"/>
-            </a:br>
-            <a:br>
-              <a:rPr lang="en-US" dirty="0"/>
-            </a:br>
-            <a:br>
-              <a:rPr lang="fr-FR" dirty="0"/>
-            </a:br>
-            <a:endParaRPr lang="en-US" sz="1600" dirty="0"/>
+            <a:br>
+              <a:rPr lang="fr-FR" sz="1800" noProof="0" dirty="0"/>
+            </a:br>
+            <a:r>
+              <a:rPr lang="fr-FR" sz="2000" b="1" noProof="0" dirty="0"/>
+              <a:t>Un compromis doit être considéré:</a:t>
+            </a:r>
+            <a:br>
+              <a:rPr lang="fr-FR" sz="2000" noProof="0" dirty="0"/>
+            </a:br>
+            <a:br>
+              <a:rPr lang="fr-FR" sz="2000" noProof="0" dirty="0"/>
+            </a:br>
+            <a:r>
+              <a:rPr lang="fr-FR" sz="2000" noProof="0" dirty="0"/>
+              <a:t>- établir un ‘décalage’ de </a:t>
+            </a:r>
+            <a:r>
+              <a:rPr lang="fr-FR" sz="2000" b="1" noProof="0" dirty="0"/>
+              <a:t>60-minutes</a:t>
+            </a:r>
+            <a:r>
+              <a:rPr lang="fr-FR" sz="2000" noProof="0" dirty="0"/>
+              <a:t> entre deux locations permet d’éviter les conflits mais réduit la souplesse des </a:t>
+            </a:r>
+            <a:r>
+              <a:rPr lang="fr-FR" sz="2000" noProof="0" dirty="0" err="1"/>
+              <a:t>bookings</a:t>
+            </a:r>
+            <a:r>
+              <a:rPr lang="fr-FR" sz="2000" dirty="0"/>
+              <a:t>;</a:t>
+            </a:r>
+            <a:br>
+              <a:rPr lang="fr-FR" sz="2000" noProof="0" dirty="0"/>
+            </a:br>
+            <a:br>
+              <a:rPr lang="fr-FR" sz="2000" noProof="0" dirty="0"/>
+            </a:br>
+            <a:r>
+              <a:rPr lang="fr-FR" sz="2000" dirty="0"/>
+              <a:t>- il conviendrait de trouver u</a:t>
+            </a:r>
+            <a:r>
+              <a:rPr lang="fr-FR" sz="2000" noProof="0" dirty="0"/>
+              <a:t>n équilibre entre la satisfaction du client et l’optimisation des revenus.</a:t>
+            </a:r>
+            <a:br>
+              <a:rPr lang="fr-FR" noProof="0" dirty="0"/>
+            </a:br>
+            <a:br>
+              <a:rPr lang="fr-FR" sz="1600" noProof="0" dirty="0"/>
+            </a:br>
+            <a:br>
+              <a:rPr lang="fr-FR" noProof="0" dirty="0"/>
+            </a:br>
+            <a:br>
+              <a:rPr lang="fr-FR" noProof="0" dirty="0"/>
+            </a:br>
+            <a:endParaRPr lang="fr-FR" sz="1600" noProof="0" dirty="0"/>
           </a:p>
         </p:txBody>
       </p:sp>
+      <p:pic>
+        <p:nvPicPr>
+          <p:cNvPr id="3" name="Graphique 2" descr="Poignée de main avec un remplissage uni">
+            <a:extLst>
+              <a:ext uri="{FF2B5EF4-FFF2-40B4-BE49-F238E27FC236}">
+                <a16:creationId xmlns:a16="http://schemas.microsoft.com/office/drawing/2014/main" id="{789F8029-77A5-8582-C800-A6072ACB435D}"/>
+              </a:ext>
+            </a:extLst>
+          </p:cNvPr>
+          <p:cNvPicPr>
+            <a:picLocks noChangeAspect="1"/>
+          </p:cNvPicPr>
+          <p:nvPr/>
+        </p:nvPicPr>
+        <p:blipFill>
+          <a:blip r:embed="rId4">
+            <a:extLst>
+              <a:ext uri="{96DAC541-7B7A-43D3-8B79-37D633B846F1}">
+                <asvg:svgBlip xmlns:asvg="http://schemas.microsoft.com/office/drawing/2016/SVG/main" r:embed="rId5"/>
+              </a:ext>
+            </a:extLst>
+          </a:blip>
+          <a:stretch>
+            <a:fillRect/>
+          </a:stretch>
+        </p:blipFill>
+        <p:spPr>
+          <a:xfrm>
+            <a:off x="5912453" y="3966598"/>
+            <a:ext cx="914400" cy="914400"/>
+          </a:xfrm>
+          <a:prstGeom prst="rect">
+            <a:avLst/>
+          </a:prstGeom>
+        </p:spPr>
+      </p:pic>
     </p:spTree>
     <p:extLst>
       <p:ext uri="{BB962C8B-B14F-4D97-AF65-F5344CB8AC3E}">
@@ -10539,24 +10831,24 @@
           <a:lstStyle/>
           <a:p>
             <a:r>
-              <a:rPr lang="en-US" b="1" dirty="0"/>
-              <a:t>Machine Learning pricing optimization model </a:t>
-            </a:r>
-            <a:br>
-              <a:rPr lang="en-US" dirty="0"/>
-            </a:br>
-            <a:br>
-              <a:rPr lang="en-US" dirty="0"/>
-            </a:br>
-            <a:r>
-              <a:rPr lang="en-US" dirty="0"/>
-              <a:t>- training</a:t>
-            </a:r>
-            <a:br>
-              <a:rPr lang="fr-FR" b="1" dirty="0"/>
-            </a:br>
-            <a:br>
-              <a:rPr lang="fr" sz="2400" dirty="0">
+              <a:rPr lang="fr-FR" b="1" noProof="0" dirty="0"/>
+              <a:t>Modèle d’optimisation des tarifs</a:t>
+            </a:r>
+            <a:br>
+              <a:rPr lang="fr-FR" noProof="0" dirty="0"/>
+            </a:br>
+            <a:br>
+              <a:rPr lang="fr-FR" noProof="0" dirty="0"/>
+            </a:br>
+            <a:r>
+              <a:rPr lang="fr-FR" noProof="0" dirty="0"/>
+              <a:t>- entraînement</a:t>
+            </a:r>
+            <a:br>
+              <a:rPr lang="fr-FR" b="1" noProof="0" dirty="0"/>
+            </a:br>
+            <a:br>
+              <a:rPr lang="fr-FR" sz="2400" noProof="0" dirty="0">
                 <a:solidFill>
                   <a:srgbClr val="015955"/>
                 </a:solidFill>
@@ -10567,7 +10859,7 @@
               </a:rPr>
             </a:br>
             <a:br>
-              <a:rPr lang="fr" sz="2400" dirty="0">
+              <a:rPr lang="fr-FR" sz="2400" noProof="0" dirty="0">
                 <a:solidFill>
                   <a:srgbClr val="015955"/>
                 </a:solidFill>
@@ -10577,7 +10869,7 @@
                 <a:sym typeface="Inter"/>
               </a:rPr>
             </a:br>
-            <a:endParaRPr sz="2400" dirty="0">
+            <a:endParaRPr lang="fr-FR" sz="2400" noProof="0" dirty="0">
               <a:solidFill>
                 <a:srgbClr val="015955"/>
               </a:solidFill>
@@ -10658,39 +10950,53 @@
           <a:lstStyle/>
           <a:p>
             <a:r>
-              <a:rPr lang="en-US" sz="1800" dirty="0"/>
-              <a:t>Building a ML model for pricing optimization on the basis of the given data:</a:t>
-            </a:r>
-            <a:br>
-              <a:rPr lang="en-US" sz="1800" dirty="0"/>
-            </a:br>
-            <a:r>
-              <a:rPr lang="en-US" sz="1800" dirty="0"/>
-              <a:t>- Analysis of the pricing dataset and data pre-processing</a:t>
-            </a:r>
-            <a:br>
-              <a:rPr lang="en-US" sz="1800" dirty="0"/>
-            </a:br>
-            <a:r>
-              <a:rPr lang="en-US" sz="1800" dirty="0"/>
-              <a:t>- Feature engineering for optimal model training</a:t>
-            </a:r>
-            <a:br>
-              <a:rPr lang="en-US" sz="1800" dirty="0"/>
-            </a:br>
-            <a:br>
-              <a:rPr lang="en-US" sz="1600" dirty="0"/>
-            </a:br>
-            <a:br>
-              <a:rPr lang="en-US" dirty="0"/>
-            </a:br>
-            <a:br>
-              <a:rPr lang="fr-FR" sz="1600" dirty="0"/>
-            </a:br>
-            <a:br>
-              <a:rPr lang="fr-FR" dirty="0"/>
-            </a:br>
-            <a:endParaRPr lang="en-US" sz="1600" dirty="0"/>
+              <a:rPr lang="fr-FR" sz="1800" noProof="0" dirty="0"/>
+              <a:t>Construire un modèle ML pour l’optimisation des tarifs basé sur les données:</a:t>
+            </a:r>
+            <a:br>
+              <a:rPr lang="fr-FR" sz="1800" noProof="0" dirty="0"/>
+            </a:br>
+            <a:br>
+              <a:rPr lang="fr-FR" sz="1800" noProof="0" dirty="0"/>
+            </a:br>
+            <a:r>
+              <a:rPr lang="fr-FR" sz="1800" noProof="0" dirty="0"/>
+              <a:t>- Analyse du jeu de données des prix</a:t>
+            </a:r>
+            <a:br>
+              <a:rPr lang="fr-FR" sz="1800" noProof="0" dirty="0"/>
+            </a:br>
+            <a:br>
+              <a:rPr lang="fr-FR" sz="1800" noProof="0" dirty="0"/>
+            </a:br>
+            <a:r>
+              <a:rPr lang="fr-FR" sz="1800" noProof="0" dirty="0"/>
+              <a:t>- ‘</a:t>
+            </a:r>
+            <a:r>
+              <a:rPr lang="fr-FR" sz="1800" noProof="0" dirty="0" err="1"/>
+              <a:t>Feature</a:t>
+            </a:r>
+            <a:r>
+              <a:rPr lang="fr-FR" sz="1800" noProof="0" dirty="0"/>
+              <a:t> engineering’ pour optimisation de l’entraînement du modèle</a:t>
+            </a:r>
+            <a:br>
+              <a:rPr lang="fr-FR" sz="1800" noProof="0" dirty="0"/>
+            </a:br>
+            <a:br>
+              <a:rPr lang="fr-FR" sz="1600" noProof="0" dirty="0"/>
+            </a:br>
+            <a:br>
+              <a:rPr lang="fr-FR" noProof="0" dirty="0"/>
+            </a:br>
+            <a:br>
+              <a:rPr lang="fr-FR" sz="1600" noProof="0" dirty="0"/>
+            </a:br>
+            <a:br>
+              <a:rPr lang="fr-FR" noProof="0" dirty="0"/>
+            </a:br>
+            <a:endParaRPr lang="fr-FR" sz="1600" noProof="0" dirty="0"/>
           </a:p>
         </p:txBody>
       </p:sp>
@@ -10723,7 +11029,7 @@
         </p:blipFill>
         <p:spPr bwMode="auto">
           <a:xfrm>
-            <a:off x="3733475" y="2571750"/>
+            <a:off x="3736416" y="2789581"/>
             <a:ext cx="2671865" cy="1774670"/>
           </a:xfrm>
           <a:prstGeom prst="rect">
@@ -10770,7 +11076,7 @@
         </p:blipFill>
         <p:spPr bwMode="auto">
           <a:xfrm>
-            <a:off x="6618573" y="2571750"/>
+            <a:off x="6618573" y="2713115"/>
             <a:ext cx="2222692" cy="1927602"/>
           </a:xfrm>
           <a:prstGeom prst="rect">
@@ -10922,18 +11228,18 @@
           <a:lstStyle/>
           <a:p>
             <a:r>
-              <a:rPr lang="en-US" b="1" dirty="0"/>
-              <a:t>Machine Learning pricing optimization model </a:t>
-            </a:r>
-            <a:br>
-              <a:rPr lang="en-US" dirty="0"/>
-            </a:br>
-            <a:br>
-              <a:rPr lang="en-US" dirty="0"/>
-            </a:br>
-            <a:r>
-              <a:rPr lang="en-US" dirty="0"/>
-              <a:t>- training</a:t>
+              <a:rPr lang="fr-FR" b="1" dirty="0"/>
+              <a:t>Modèle d’optimisation des tarifs</a:t>
+            </a:r>
+            <a:br>
+              <a:rPr lang="fr-FR" dirty="0"/>
+            </a:br>
+            <a:br>
+              <a:rPr lang="fr-FR" dirty="0"/>
+            </a:br>
+            <a:r>
+              <a:rPr lang="fr-FR" dirty="0"/>
+              <a:t>- entraînement</a:t>
             </a:r>
             <a:br>
               <a:rPr lang="fr-FR" b="1" dirty="0"/>
@@ -11041,94 +11347,37 @@
           <a:lstStyle/>
           <a:p>
             <a:r>
-              <a:rPr lang="en-US" sz="1800" dirty="0"/>
-              <a:t>- Training 4 different ML models for pricing optimization: </a:t>
-            </a:r>
-            <a:r>
-              <a:rPr lang="fr-FR" sz="1800" dirty="0"/>
-              <a:t> </a:t>
-            </a:r>
-            <a:r>
-              <a:rPr lang="fr-FR" sz="1800" dirty="0" err="1"/>
-              <a:t>Linear</a:t>
-            </a:r>
-            <a:r>
-              <a:rPr lang="fr-FR" sz="1800" dirty="0"/>
-              <a:t> </a:t>
-            </a:r>
-            <a:r>
-              <a:rPr lang="fr-FR" sz="1800" dirty="0" err="1"/>
-              <a:t>Regression</a:t>
-            </a:r>
-            <a:r>
-              <a:rPr lang="fr-FR" sz="1800" dirty="0"/>
-              <a:t>, </a:t>
-            </a:r>
-            <a:r>
-              <a:rPr lang="fr-FR" sz="1800" dirty="0" err="1"/>
-              <a:t>Random</a:t>
-            </a:r>
-            <a:r>
-              <a:rPr lang="fr-FR" sz="1800" dirty="0"/>
-              <a:t> Forest </a:t>
-            </a:r>
-            <a:r>
-              <a:rPr lang="fr-FR" sz="1800" dirty="0" err="1"/>
-              <a:t>Regressor</a:t>
-            </a:r>
-            <a:r>
-              <a:rPr lang="fr-FR" sz="1800" dirty="0"/>
-              <a:t>, </a:t>
-            </a:r>
-            <a:r>
-              <a:rPr lang="fr-FR" sz="1800" dirty="0" err="1"/>
+              <a:rPr lang="fr-FR" sz="1800" noProof="0" dirty="0"/>
+              <a:t>- Entraînement de 4 modèles différents pour optimisation des prix</a:t>
+            </a:r>
+            <a:br>
+              <a:rPr lang="fr-FR" sz="1800" noProof="0" dirty="0"/>
+            </a:br>
+            <a:br>
+              <a:rPr lang="fr-FR" sz="1800" noProof="0" dirty="0"/>
+            </a:br>
+            <a:r>
+              <a:rPr lang="fr-FR" sz="1800" noProof="0" dirty="0"/>
+              <a:t>- Sélection du Meilleur modèle en fonction des métriques d’évaluation: The </a:t>
+            </a:r>
+            <a:r>
+              <a:rPr lang="fr-FR" sz="1800" noProof="0" dirty="0" err="1"/>
               <a:t>XGBoost</a:t>
             </a:r>
             <a:r>
-              <a:rPr lang="fr-FR" sz="1800" dirty="0"/>
-              <a:t> </a:t>
-            </a:r>
-            <a:r>
-              <a:rPr lang="fr-FR" sz="1800" dirty="0" err="1"/>
-              <a:t>Regressor</a:t>
-            </a:r>
-            <a:r>
-              <a:rPr lang="fr-FR" sz="1800" dirty="0"/>
-              <a:t> (basic and </a:t>
-            </a:r>
-            <a:r>
-              <a:rPr lang="fr-FR" sz="1800" dirty="0" err="1"/>
-              <a:t>optimized</a:t>
-            </a:r>
-            <a:r>
-              <a:rPr lang="fr-FR" sz="1800" dirty="0"/>
-              <a:t>)</a:t>
-            </a:r>
-            <a:br>
-              <a:rPr lang="en-US" sz="1800" dirty="0"/>
-            </a:br>
-            <a:r>
-              <a:rPr lang="en-US" sz="1800" dirty="0"/>
-              <a:t>- Best model selection based on evaluation metrics: The </a:t>
-            </a:r>
-            <a:r>
-              <a:rPr lang="en-US" sz="1800" dirty="0" err="1"/>
-              <a:t>XGBoost</a:t>
-            </a:r>
-            <a:r>
-              <a:rPr lang="en-US" sz="1800" dirty="0"/>
-              <a:t> (Optimized) with the highest R² score: 0.7611</a:t>
-            </a:r>
-            <a:br>
-              <a:rPr lang="en-US" dirty="0"/>
-            </a:br>
-            <a:br>
-              <a:rPr lang="fr-FR" sz="1600" dirty="0"/>
-            </a:br>
-            <a:br>
-              <a:rPr lang="fr-FR" dirty="0"/>
-            </a:br>
-            <a:endParaRPr lang="en-US" sz="1600" dirty="0"/>
+              <a:rPr lang="fr-FR" sz="1800" noProof="0" dirty="0"/>
+              <a:t> (Optimisé) avec le plus haut score R² : 0.7611</a:t>
+            </a:r>
+            <a:br>
+              <a:rPr lang="fr-FR" noProof="0" dirty="0"/>
+            </a:br>
+            <a:br>
+              <a:rPr lang="fr-FR" sz="1600" noProof="0" dirty="0"/>
+            </a:br>
+            <a:br>
+              <a:rPr lang="fr-FR" noProof="0" dirty="0"/>
+            </a:br>
+            <a:endParaRPr lang="fr-FR" sz="1600" noProof="0" dirty="0"/>
           </a:p>
         </p:txBody>
       </p:sp>
@@ -11296,18 +11545,18 @@
           <a:lstStyle/>
           <a:p>
             <a:r>
-              <a:rPr lang="en-US" b="1" dirty="0"/>
-              <a:t>Machine Learning pricing optimization model </a:t>
-            </a:r>
-            <a:br>
-              <a:rPr lang="en-US" dirty="0"/>
-            </a:br>
-            <a:br>
-              <a:rPr lang="en-US" dirty="0"/>
-            </a:br>
-            <a:r>
-              <a:rPr lang="en-US" dirty="0"/>
-              <a:t>- deployment</a:t>
+              <a:rPr lang="fr-FR" b="1" dirty="0"/>
+              <a:t>Modèle d’optimisation des tarifs</a:t>
+            </a:r>
+            <a:br>
+              <a:rPr lang="fr-FR" dirty="0"/>
+            </a:br>
+            <a:br>
+              <a:rPr lang="fr-FR" dirty="0"/>
+            </a:br>
+            <a:r>
+              <a:rPr lang="fr-FR" dirty="0"/>
+              <a:t>- déploiement</a:t>
             </a:r>
             <a:br>
               <a:rPr lang="fr-FR" b="1" dirty="0"/>
@@ -11415,61 +11664,73 @@
           <a:lstStyle/>
           <a:p>
             <a:r>
-              <a:rPr lang="en-US" sz="1600" dirty="0"/>
-              <a:t>- </a:t>
-            </a:r>
-            <a:r>
-              <a:rPr lang="en-US" sz="1600" dirty="0" err="1"/>
-              <a:t>Builiding</a:t>
-            </a:r>
-            <a:r>
-              <a:rPr lang="en-US" sz="1600" dirty="0"/>
-              <a:t> an API to create a /predict endpoint for pricing predictions based on the previously created ML model (</a:t>
-            </a:r>
-            <a:r>
-              <a:rPr lang="en-US" sz="1600" dirty="0" err="1"/>
+              <a:rPr lang="fr-FR" sz="1600" noProof="0" dirty="0"/>
+              <a:t>- Création d’une API avec un </a:t>
+            </a:r>
+            <a:r>
+              <a:rPr lang="fr-FR" sz="1600" noProof="0" dirty="0" err="1"/>
+              <a:t>endpoint</a:t>
+            </a:r>
+            <a:r>
+              <a:rPr lang="fr-FR" sz="1600" noProof="0" dirty="0"/>
+              <a:t> /</a:t>
+            </a:r>
+            <a:r>
+              <a:rPr lang="fr-FR" sz="1600" noProof="0" dirty="0" err="1"/>
+              <a:t>predict</a:t>
+            </a:r>
+            <a:r>
+              <a:rPr lang="fr-FR" sz="1600" noProof="0" dirty="0"/>
+              <a:t> pour la prédiction des tarifs sur la base du modèle sélectionné (</a:t>
+            </a:r>
+            <a:r>
+              <a:rPr lang="fr-FR" sz="1600" noProof="0" dirty="0" err="1"/>
               <a:t>XGBoost</a:t>
             </a:r>
             <a:r>
-              <a:rPr lang="en-US" sz="1600" dirty="0"/>
-              <a:t> Optimized)</a:t>
-            </a:r>
-            <a:br>
-              <a:rPr lang="en-US" sz="1600" dirty="0"/>
-            </a:br>
-            <a:br>
-              <a:rPr lang="en-US" sz="1600" dirty="0"/>
-            </a:br>
-            <a:r>
-              <a:rPr lang="en-US" sz="1600" dirty="0"/>
-              <a:t>- Preparing the API Documentation to provide clear usage instructions at /docs.</a:t>
-            </a:r>
-            <a:br>
-              <a:rPr lang="en-US" sz="1600" dirty="0"/>
-            </a:br>
-            <a:br>
-              <a:rPr lang="en-US" sz="1600" dirty="0"/>
-            </a:br>
-            <a:r>
-              <a:rPr lang="en-US" sz="1600" dirty="0"/>
-              <a:t>- Deployment: hosting the API on HF Spaces</a:t>
-            </a:r>
-            <a:br>
-              <a:rPr lang="en-US" dirty="0"/>
-            </a:br>
-            <a:br>
-              <a:rPr lang="en-US" sz="1600" dirty="0"/>
-            </a:br>
-            <a:br>
-              <a:rPr lang="en-US" dirty="0"/>
-            </a:br>
-            <a:br>
-              <a:rPr lang="fr-FR" sz="1600" dirty="0"/>
-            </a:br>
-            <a:br>
-              <a:rPr lang="fr-FR" dirty="0"/>
-            </a:br>
-            <a:endParaRPr lang="en-US" sz="1600" dirty="0"/>
+              <a:rPr lang="fr-FR" sz="1600" noProof="0" dirty="0"/>
+              <a:t> Optimisé)</a:t>
+            </a:r>
+            <a:br>
+              <a:rPr lang="fr-FR" sz="1600" noProof="0" dirty="0"/>
+            </a:br>
+            <a:br>
+              <a:rPr lang="fr-FR" sz="1600" noProof="0" dirty="0"/>
+            </a:br>
+            <a:r>
+              <a:rPr lang="fr-FR" sz="1600" noProof="0" dirty="0"/>
+              <a:t>- Préparation de la Documentation de l’API pour assurer des instructions claires d’utilisation sur /docs.</a:t>
+            </a:r>
+            <a:br>
+              <a:rPr lang="fr-FR" sz="1600" noProof="0" dirty="0"/>
+            </a:br>
+            <a:br>
+              <a:rPr lang="fr-FR" sz="1600" noProof="0" dirty="0"/>
+            </a:br>
+            <a:r>
+              <a:rPr lang="fr-FR" sz="1600" noProof="0" dirty="0"/>
+              <a:t>- Déploiement: hébergement de l’API sur HF </a:t>
+            </a:r>
+            <a:r>
+              <a:rPr lang="fr-FR" sz="1600" noProof="0" dirty="0" err="1"/>
+              <a:t>Spaces</a:t>
+            </a:r>
+            <a:br>
+              <a:rPr lang="fr-FR" noProof="0" dirty="0"/>
+            </a:br>
+            <a:br>
+              <a:rPr lang="fr-FR" sz="1600" noProof="0" dirty="0"/>
+            </a:br>
+            <a:br>
+              <a:rPr lang="fr-FR" noProof="0" dirty="0"/>
+            </a:br>
+            <a:br>
+              <a:rPr lang="fr-FR" sz="1600" noProof="0" dirty="0"/>
+            </a:br>
+            <a:br>
+              <a:rPr lang="fr-FR" noProof="0" dirty="0"/>
+            </a:br>
+            <a:endParaRPr lang="fr-FR" sz="1600" noProof="0" dirty="0"/>
           </a:p>
         </p:txBody>
       </p:sp>

</xml_diff>